<commit_message>
final changes to pptx, readme, and images
</commit_message>
<xml_diff>
--- a/Employee Attrition.pptx
+++ b/Employee Attrition.pptx
@@ -205,7 +205,7 @@
           <a:p>
             <a:fld id="{A9B49D2D-D62A-42CD-AB1D-62CE25CC24DF}" type="datetimeFigureOut">
               <a:rPr lang="en-US" smtClean="0"/>
-              <a:t>3/4/2022</a:t>
+              <a:t>3/5/2022</a:t>
             </a:fld>
             <a:endParaRPr lang="en-US"/>
           </a:p>
@@ -1501,7 +1501,7 @@
           <a:p>
             <a:fld id="{5E7AA473-D82F-4EFF-9DF7-AE6D83C51288}" type="datetime1">
               <a:rPr lang="en-US" smtClean="0"/>
-              <a:t>3/2/2022</a:t>
+              <a:t>3/5/2022</a:t>
             </a:fld>
             <a:endParaRPr lang="en-US"/>
           </a:p>
@@ -1752,7 +1752,7 @@
           <a:p>
             <a:fld id="{734BCCD4-CEB1-405B-A443-DD9CBCBEA552}" type="datetime1">
               <a:rPr lang="en-US" smtClean="0"/>
-              <a:t>3/2/2022</a:t>
+              <a:t>3/5/2022</a:t>
             </a:fld>
             <a:endParaRPr lang="en-US"/>
           </a:p>
@@ -2068,7 +2068,7 @@
           <a:p>
             <a:fld id="{734BCCD4-CEB1-405B-A443-DD9CBCBEA552}" type="datetime1">
               <a:rPr lang="en-US" smtClean="0"/>
-              <a:t>3/2/2022</a:t>
+              <a:t>3/5/2022</a:t>
             </a:fld>
             <a:endParaRPr lang="en-US"/>
           </a:p>
@@ -2411,7 +2411,7 @@
           <a:p>
             <a:fld id="{734BCCD4-CEB1-405B-A443-DD9CBCBEA552}" type="datetime1">
               <a:rPr lang="en-US" smtClean="0"/>
-              <a:t>3/2/2022</a:t>
+              <a:t>3/5/2022</a:t>
             </a:fld>
             <a:endParaRPr lang="en-US"/>
           </a:p>
@@ -2727,7 +2727,7 @@
           <a:p>
             <a:fld id="{734BCCD4-CEB1-405B-A443-DD9CBCBEA552}" type="datetime1">
               <a:rPr lang="en-US" smtClean="0"/>
-              <a:t>3/2/2022</a:t>
+              <a:t>3/5/2022</a:t>
             </a:fld>
             <a:endParaRPr lang="en-US"/>
           </a:p>
@@ -3122,7 +3122,7 @@
           <a:p>
             <a:fld id="{734BCCD4-CEB1-405B-A443-DD9CBCBEA552}" type="datetime1">
               <a:rPr lang="en-US" smtClean="0"/>
-              <a:t>3/2/2022</a:t>
+              <a:t>3/5/2022</a:t>
             </a:fld>
             <a:endParaRPr lang="en-US"/>
           </a:p>
@@ -3294,7 +3294,7 @@
           <a:p>
             <a:fld id="{1E12F1F0-FE2D-4C1C-B320-8CB9BE735F0F}" type="datetime1">
               <a:rPr lang="en-US" smtClean="0"/>
-              <a:t>3/2/2022</a:t>
+              <a:t>3/5/2022</a:t>
             </a:fld>
             <a:endParaRPr lang="en-US"/>
           </a:p>
@@ -3474,7 +3474,7 @@
           <a:p>
             <a:fld id="{2CF1B96C-10FD-4EBC-9029-9652B7535D02}" type="datetime1">
               <a:rPr lang="en-US" smtClean="0"/>
-              <a:t>3/2/2022</a:t>
+              <a:t>3/5/2022</a:t>
             </a:fld>
             <a:endParaRPr lang="en-US"/>
           </a:p>
@@ -3650,7 +3650,7 @@
           <a:p>
             <a:fld id="{14878474-CC00-4A95-9D50-A41C12D1EEC4}" type="datetime1">
               <a:rPr lang="en-US" smtClean="0"/>
-              <a:t>3/2/2022</a:t>
+              <a:t>3/5/2022</a:t>
             </a:fld>
             <a:endParaRPr lang="en-US"/>
           </a:p>
@@ -3897,7 +3897,7 @@
           <a:p>
             <a:fld id="{7F38C8B4-7FBB-408F-BDB9-F0496874AFB2}" type="datetime1">
               <a:rPr lang="en-US" smtClean="0"/>
-              <a:t>3/2/2022</a:t>
+              <a:t>3/5/2022</a:t>
             </a:fld>
             <a:endParaRPr lang="en-US"/>
           </a:p>
@@ -4129,7 +4129,7 @@
           <a:p>
             <a:fld id="{2BB8EE20-A5E2-47D3-8F6D-A2BA7AB2E093}" type="datetime1">
               <a:rPr lang="en-US" smtClean="0"/>
-              <a:t>3/2/2022</a:t>
+              <a:t>3/5/2022</a:t>
             </a:fld>
             <a:endParaRPr lang="en-US"/>
           </a:p>
@@ -4503,7 +4503,7 @@
           <a:p>
             <a:fld id="{3382CF99-132F-413F-B7EF-71A5C33F2ED6}" type="datetime1">
               <a:rPr lang="en-US" smtClean="0"/>
-              <a:t>3/2/2022</a:t>
+              <a:t>3/5/2022</a:t>
             </a:fld>
             <a:endParaRPr lang="en-US"/>
           </a:p>
@@ -4626,7 +4626,7 @@
           <a:p>
             <a:fld id="{1F17AE06-98E0-4D9F-A059-92C3548821BB}" type="datetime1">
               <a:rPr lang="en-US" smtClean="0"/>
-              <a:t>3/2/2022</a:t>
+              <a:t>3/5/2022</a:t>
             </a:fld>
             <a:endParaRPr lang="en-US"/>
           </a:p>
@@ -4721,7 +4721,7 @@
           <a:p>
             <a:fld id="{FFBA00CA-3DDC-4705-B840-978EF5EA0707}" type="datetime1">
               <a:rPr lang="en-US" smtClean="0"/>
-              <a:t>3/2/2022</a:t>
+              <a:t>3/5/2022</a:t>
             </a:fld>
             <a:endParaRPr lang="en-US"/>
           </a:p>
@@ -4976,7 +4976,7 @@
           <a:p>
             <a:fld id="{FC366D49-0BBA-4C5A-AD96-6448CA63451A}" type="datetime1">
               <a:rPr lang="en-US" smtClean="0"/>
-              <a:t>3/2/2022</a:t>
+              <a:t>3/5/2022</a:t>
             </a:fld>
             <a:endParaRPr lang="en-US"/>
           </a:p>
@@ -5239,7 +5239,7 @@
           <a:p>
             <a:fld id="{4F4EB293-A316-472D-A8B4-6947CF1A12B7}" type="datetime1">
               <a:rPr lang="en-US" smtClean="0"/>
-              <a:t>3/2/2022</a:t>
+              <a:t>3/5/2022</a:t>
             </a:fld>
             <a:endParaRPr lang="en-US"/>
           </a:p>
@@ -5982,7 +5982,7 @@
           <a:p>
             <a:fld id="{734BCCD4-CEB1-405B-A443-DD9CBCBEA552}" type="datetime1">
               <a:rPr lang="en-US" smtClean="0"/>
-              <a:t>3/2/2022</a:t>
+              <a:t>3/5/2022</a:t>
             </a:fld>
             <a:endParaRPr lang="en-US"/>
           </a:p>
@@ -7497,7 +7497,7 @@
                 <a:satMod val="400000"/>
               </a:schemeClr>
             </a:duotone>
-            <a:alphaModFix amt="40000"/>
+            <a:alphaModFix amt="17000"/>
             <a:extLst>
               <a:ext uri="{28A0092B-C50C-407E-A947-70E740481C1C}">
                 <a14:useLocalDpi xmlns:a14="http://schemas.microsoft.com/office/drawing/2010/main" val="0"/>
@@ -7509,7 +7509,7 @@
         </p:blipFill>
         <p:spPr>
           <a:xfrm>
-            <a:off x="20" y="10"/>
+            <a:off x="0" y="0"/>
             <a:ext cx="12191980" cy="6857990"/>
           </a:xfrm>
           <a:prstGeom prst="rect">
@@ -7572,50 +7572,16 @@
         </p:nvSpPr>
         <p:spPr>
           <a:xfrm>
-            <a:off x="397110" y="2367627"/>
-            <a:ext cx="10439845" cy="3880773"/>
+            <a:off x="4068106" y="3067629"/>
+            <a:ext cx="3520134" cy="998197"/>
           </a:xfrm>
         </p:spPr>
         <p:txBody>
           <a:bodyPr>
-            <a:normAutofit lnSpcReduction="10000"/>
+            <a:normAutofit/>
           </a:bodyPr>
           <a:lstStyle/>
           <a:p>
-            <a:r>
-              <a:rPr lang="en-US" sz="2400" dirty="0"/>
-              <a:t>Company Impacts:</a:t>
-            </a:r>
-          </a:p>
-          <a:p>
-            <a:pPr lvl="1"/>
-            <a:r>
-              <a:rPr lang="en-US" sz="2000" dirty="0"/>
-              <a:t>Cost</a:t>
-            </a:r>
-          </a:p>
-          <a:p>
-            <a:pPr lvl="2"/>
-            <a:r>
-              <a:rPr lang="en-US" sz="1800" dirty="0"/>
-              <a:t>Attrition</a:t>
-            </a:r>
-          </a:p>
-          <a:p>
-            <a:pPr lvl="2"/>
-            <a:r>
-              <a:rPr lang="en-US" sz="1800" dirty="0"/>
-              <a:t>Productivity</a:t>
-            </a:r>
-          </a:p>
-          <a:p>
-            <a:pPr lvl="2"/>
-            <a:r>
-              <a:rPr lang="en-US" sz="1800" dirty="0"/>
-              <a:t>Training</a:t>
-            </a:r>
-          </a:p>
-          <a:p>
             <a:pPr lvl="1"/>
             <a:r>
               <a:rPr lang="en-US" sz="2000" dirty="0"/>
@@ -7623,35 +7589,9 @@
             </a:r>
           </a:p>
           <a:p>
-            <a:pPr lvl="1"/>
-            <a:r>
-              <a:rPr lang="en-US" sz="2000" dirty="0"/>
-              <a:t>Employee Value</a:t>
-            </a:r>
-          </a:p>
-          <a:p>
-            <a:pPr lvl="2"/>
-            <a:r>
-              <a:rPr lang="en-US" sz="1800" dirty="0"/>
-              <a:t>Performance Rating</a:t>
-            </a:r>
-          </a:p>
-          <a:p>
-            <a:pPr lvl="2"/>
-            <a:r>
-              <a:rPr lang="en-US" sz="1800" dirty="0"/>
-              <a:t>Experience &amp; Skills</a:t>
-            </a:r>
-          </a:p>
-          <a:p>
-            <a:pPr lvl="2"/>
-            <a:r>
-              <a:rPr lang="en-US" sz="1800" dirty="0"/>
-              <a:t>Satisfaction Metrics</a:t>
-            </a:r>
-          </a:p>
-          <a:p>
-            <a:pPr lvl="1"/>
+            <a:pPr marL="457200" lvl="1" indent="0">
+              <a:buNone/>
+            </a:pPr>
             <a:endParaRPr lang="en-US" sz="3000" dirty="0"/>
           </a:p>
           <a:p>
@@ -7677,7 +7617,7 @@
         </p:nvSpPr>
         <p:spPr>
           <a:xfrm>
-            <a:off x="3773948" y="1583841"/>
+            <a:off x="2340259" y="1722917"/>
             <a:ext cx="7875508" cy="923330"/>
           </a:xfrm>
           <a:prstGeom prst="rect">
@@ -7707,203 +7647,12 @@
           </a:p>
         </p:txBody>
       </p:sp>
-    </p:spTree>
-    <p:extLst>
-      <p:ext uri="{BB962C8B-B14F-4D97-AF65-F5344CB8AC3E}">
-        <p14:creationId xmlns:p14="http://schemas.microsoft.com/office/powerpoint/2010/main" val="3652629353"/>
-      </p:ext>
-    </p:extLst>
-  </p:cSld>
-  <p:clrMapOvr>
-    <a:overrideClrMapping bg1="dk1" tx1="lt1" bg2="dk2" tx2="lt2" accent1="accent1" accent2="accent2" accent3="accent3" accent4="accent4" accent5="accent5" accent6="accent6" hlink="hlink" folHlink="folHlink"/>
-  </p:clrMapOvr>
-</p:sld>
-</file>
-
-<file path=ppt/slides/slide3.xml><?xml version="1.0" encoding="utf-8"?>
-<p:sld xmlns:a="http://schemas.openxmlformats.org/drawingml/2006/main" xmlns:r="http://schemas.openxmlformats.org/officeDocument/2006/relationships" xmlns:p="http://schemas.openxmlformats.org/presentationml/2006/main">
-  <p:cSld>
-    <p:bg>
-      <p:bgPr>
-        <a:solidFill>
-          <a:schemeClr val="bg2"/>
-        </a:solidFill>
-        <a:effectLst/>
-      </p:bgPr>
-    </p:bg>
-    <p:spTree>
-      <p:nvGrpSpPr>
-        <p:cNvPr id="1" name=""/>
-        <p:cNvGrpSpPr/>
-        <p:nvPr/>
-      </p:nvGrpSpPr>
-      <p:grpSpPr>
-        <a:xfrm>
-          <a:off x="0" y="0"/>
-          <a:ext cx="0" cy="0"/>
-          <a:chOff x="0" y="0"/>
-          <a:chExt cx="0" cy="0"/>
-        </a:xfrm>
-      </p:grpSpPr>
-      <p:sp>
-        <p:nvSpPr>
-          <p:cNvPr id="2" name="Title 1">
+      <p:sp>
+        <p:nvSpPr>
+          <p:cNvPr id="10" name="Content Placeholder 7">
             <a:extLst>
               <a:ext uri="{FF2B5EF4-FFF2-40B4-BE49-F238E27FC236}">
-                <a16:creationId xmlns:a16="http://schemas.microsoft.com/office/drawing/2014/main" id="{A571B95F-A299-4B67-94E7-E6673A47CB2E}"/>
-              </a:ext>
-            </a:extLst>
-          </p:cNvPr>
-          <p:cNvSpPr>
-            <a:spLocks noGrp="1"/>
-          </p:cNvSpPr>
-          <p:nvPr>
-            <p:ph type="title"/>
-          </p:nvPr>
-        </p:nvSpPr>
-        <p:spPr>
-          <a:xfrm>
-            <a:off x="1714615" y="683491"/>
-            <a:ext cx="3737268" cy="1320800"/>
-          </a:xfrm>
-        </p:spPr>
-        <p:txBody>
-          <a:bodyPr>
-            <a:normAutofit fontScale="90000"/>
-          </a:bodyPr>
-          <a:lstStyle/>
-          <a:p>
-            <a:r>
-              <a:rPr lang="en-US" dirty="0"/>
-              <a:t>Reducing attrition translates into:</a:t>
-            </a:r>
-          </a:p>
-        </p:txBody>
-      </p:sp>
-      <p:pic>
-        <p:nvPicPr>
-          <p:cNvPr id="5" name="Picture 4">
-            <a:extLst>
-              <a:ext uri="{FF2B5EF4-FFF2-40B4-BE49-F238E27FC236}">
-                <a16:creationId xmlns:a16="http://schemas.microsoft.com/office/drawing/2014/main" id="{02EFC4A6-F157-44A4-97DF-58D824A90F88}"/>
-              </a:ext>
-            </a:extLst>
-          </p:cNvPr>
-          <p:cNvPicPr>
-            <a:picLocks noChangeAspect="1"/>
-          </p:cNvPicPr>
-          <p:nvPr/>
-        </p:nvPicPr>
-        <p:blipFill rotWithShape="1">
-          <a:blip r:embed="rId2">
-            <a:extLst>
-              <a:ext uri="{28A0092B-C50C-407E-A947-70E740481C1C}">
-                <a14:useLocalDpi xmlns:a14="http://schemas.microsoft.com/office/drawing/2010/main" val="0"/>
-              </a:ext>
-            </a:extLst>
-          </a:blip>
-          <a:srcRect l="28473" r="27400" b="1"/>
-          <a:stretch/>
-        </p:blipFill>
-        <p:spPr>
-          <a:xfrm>
-            <a:off x="6576532" y="0"/>
-            <a:ext cx="5394940" cy="6858001"/>
-          </a:xfrm>
-          <a:custGeom>
-            <a:avLst/>
-            <a:gdLst/>
-            <a:ahLst/>
-            <a:cxnLst/>
-            <a:rect l="l" t="t" r="r" b="b"/>
-            <a:pathLst>
-              <a:path w="5394960" h="6858000">
-                <a:moveTo>
-                  <a:pt x="842596" y="0"/>
-                </a:moveTo>
-                <a:lnTo>
-                  <a:pt x="5394960" y="0"/>
-                </a:lnTo>
-                <a:lnTo>
-                  <a:pt x="5394960" y="21851"/>
-                </a:lnTo>
-                <a:lnTo>
-                  <a:pt x="4365943" y="6858000"/>
-                </a:lnTo>
-                <a:lnTo>
-                  <a:pt x="0" y="6858000"/>
-                </a:lnTo>
-                <a:lnTo>
-                  <a:pt x="0" y="5666154"/>
-                </a:lnTo>
-                <a:close/>
-              </a:path>
-            </a:pathLst>
-          </a:custGeom>
-        </p:spPr>
-      </p:pic>
-      <p:sp>
-        <p:nvSpPr>
-          <p:cNvPr id="53" name="Isosceles Triangle 14">
-            <a:extLst>
-              <a:ext uri="{FF2B5EF4-FFF2-40B4-BE49-F238E27FC236}">
-                <a16:creationId xmlns:a16="http://schemas.microsoft.com/office/drawing/2014/main" id="{3BCB5F6A-9EB0-40B0-9D13-3023E9A20508}"/>
-              </a:ext>
-              <a:ext uri="{C183D7F6-B498-43B3-948B-1728B52AA6E4}">
-                <adec:decorative xmlns:adec="http://schemas.microsoft.com/office/drawing/2017/decorative" val="1"/>
-              </a:ext>
-            </a:extLst>
-          </p:cNvPr>
-          <p:cNvSpPr>
-            <a:spLocks noGrp="1" noRot="1" noChangeAspect="1" noMove="1" noResize="1" noEditPoints="1" noAdjustHandles="1" noChangeArrowheads="1" noChangeShapeType="1" noTextEdit="1"/>
-          </p:cNvSpPr>
-          <p:nvPr>
-            <p:extLst>
-              <p:ext uri="{386F3935-93C4-4BCD-93E2-E3B085C9AB24}">
-                <p16:designElem xmlns:p16="http://schemas.microsoft.com/office/powerpoint/2015/main" val="1"/>
-              </p:ext>
-            </p:extLst>
-          </p:nvPr>
-        </p:nvSpPr>
-        <p:spPr>
-          <a:xfrm rot="10800000">
-            <a:off x="0" y="0"/>
-            <a:ext cx="842596" cy="5666154"/>
-          </a:xfrm>
-          <a:prstGeom prst="triangle">
-            <a:avLst>
-              <a:gd name="adj" fmla="val 100000"/>
-            </a:avLst>
-          </a:prstGeom>
-          <a:solidFill>
-            <a:schemeClr val="accent1"/>
-          </a:solidFill>
-          <a:ln>
-            <a:noFill/>
-          </a:ln>
-          <a:effectLst/>
-        </p:spPr>
-        <p:style>
-          <a:lnRef idx="1">
-            <a:schemeClr val="accent1"/>
-          </a:lnRef>
-          <a:fillRef idx="3">
-            <a:schemeClr val="accent1"/>
-          </a:fillRef>
-          <a:effectRef idx="2">
-            <a:schemeClr val="accent1"/>
-          </a:effectRef>
-          <a:fontRef idx="minor">
-            <a:schemeClr val="lt1"/>
-          </a:fontRef>
-        </p:style>
-      </p:sp>
-      <p:sp>
-        <p:nvSpPr>
-          <p:cNvPr id="38" name="Content Placeholder 2">
-            <a:extLst>
-              <a:ext uri="{FF2B5EF4-FFF2-40B4-BE49-F238E27FC236}">
-                <a16:creationId xmlns:a16="http://schemas.microsoft.com/office/drawing/2014/main" id="{50B6D3CE-BEF4-48B8-8DC8-0594141752C2}"/>
+                <a16:creationId xmlns:a16="http://schemas.microsoft.com/office/drawing/2014/main" id="{DF441445-670F-4147-A036-D4D17AE4FB28}"/>
               </a:ext>
             </a:extLst>
           </p:cNvPr>
@@ -7914,8 +7663,8 @@
         </p:nvSpPr>
         <p:spPr>
           <a:xfrm>
-            <a:off x="1677345" y="2293736"/>
-            <a:ext cx="4064439" cy="3880773"/>
+            <a:off x="7711702" y="3067629"/>
+            <a:ext cx="3520134" cy="3880773"/>
           </a:xfrm>
           <a:prstGeom prst="rect">
             <a:avLst/>
@@ -8153,6 +7902,789 @@
             </a:lvl9pPr>
           </a:lstStyle>
           <a:p>
+            <a:pPr lvl="1"/>
+            <a:r>
+              <a:rPr lang="en-US" sz="2000" dirty="0"/>
+              <a:t>Employee Value</a:t>
+            </a:r>
+          </a:p>
+          <a:p>
+            <a:pPr lvl="2"/>
+            <a:r>
+              <a:rPr lang="en-US" sz="1800" dirty="0"/>
+              <a:t>Performance Rating</a:t>
+            </a:r>
+          </a:p>
+          <a:p>
+            <a:pPr lvl="2"/>
+            <a:r>
+              <a:rPr lang="en-US" sz="1800" dirty="0"/>
+              <a:t>Experience &amp; Skills</a:t>
+            </a:r>
+          </a:p>
+          <a:p>
+            <a:pPr lvl="2"/>
+            <a:r>
+              <a:rPr lang="en-US" sz="1800" dirty="0"/>
+              <a:t>Satisfaction Metrics</a:t>
+            </a:r>
+          </a:p>
+          <a:p>
+            <a:pPr lvl="1"/>
+            <a:endParaRPr lang="en-US" sz="3000" dirty="0"/>
+          </a:p>
+          <a:p>
+            <a:endParaRPr lang="en-US" dirty="0">
+              <a:solidFill>
+                <a:srgbClr val="FFFFFF"/>
+              </a:solidFill>
+            </a:endParaRPr>
+          </a:p>
+        </p:txBody>
+      </p:sp>
+      <p:sp>
+        <p:nvSpPr>
+          <p:cNvPr id="12" name="Content Placeholder 7">
+            <a:extLst>
+              <a:ext uri="{FF2B5EF4-FFF2-40B4-BE49-F238E27FC236}">
+                <a16:creationId xmlns:a16="http://schemas.microsoft.com/office/drawing/2014/main" id="{02089A75-5155-4ACC-B6B3-745CD3DB9E28}"/>
+              </a:ext>
+            </a:extLst>
+          </p:cNvPr>
+          <p:cNvSpPr txBox="1">
+            <a:spLocks/>
+          </p:cNvSpPr>
+          <p:nvPr/>
+        </p:nvSpPr>
+        <p:spPr>
+          <a:xfrm>
+            <a:off x="424510" y="3067629"/>
+            <a:ext cx="3520134" cy="1666321"/>
+          </a:xfrm>
+          <a:prstGeom prst="rect">
+            <a:avLst/>
+          </a:prstGeom>
+        </p:spPr>
+        <p:txBody>
+          <a:bodyPr vert="horz" lIns="91440" tIns="45720" rIns="91440" bIns="45720" rtlCol="0">
+            <a:normAutofit/>
+          </a:bodyPr>
+          <a:lstStyle>
+            <a:lvl1pPr marL="342900" indent="-342900" algn="l" defTabSz="457200" rtl="0" eaLnBrk="1" latinLnBrk="0" hangingPunct="1">
+              <a:spcBef>
+                <a:spcPts val="1000"/>
+              </a:spcBef>
+              <a:spcAft>
+                <a:spcPts val="0"/>
+              </a:spcAft>
+              <a:buClr>
+                <a:schemeClr val="accent1"/>
+              </a:buClr>
+              <a:buSzPct val="80000"/>
+              <a:buFont typeface="Wingdings 3" charset="2"/>
+              <a:buChar char=""/>
+              <a:defRPr sz="1800" kern="1200">
+                <a:solidFill>
+                  <a:schemeClr val="tx1">
+                    <a:lumMod val="75000"/>
+                    <a:lumOff val="25000"/>
+                  </a:schemeClr>
+                </a:solidFill>
+                <a:latin typeface="+mn-lt"/>
+                <a:ea typeface="+mn-ea"/>
+                <a:cs typeface="+mn-cs"/>
+              </a:defRPr>
+            </a:lvl1pPr>
+            <a:lvl2pPr marL="742950" indent="-285750" algn="l" defTabSz="457200" rtl="0" eaLnBrk="1" latinLnBrk="0" hangingPunct="1">
+              <a:spcBef>
+                <a:spcPts val="1000"/>
+              </a:spcBef>
+              <a:spcAft>
+                <a:spcPts val="0"/>
+              </a:spcAft>
+              <a:buClr>
+                <a:schemeClr val="accent1"/>
+              </a:buClr>
+              <a:buSzPct val="80000"/>
+              <a:buFont typeface="Wingdings 3" charset="2"/>
+              <a:buChar char=""/>
+              <a:defRPr sz="1600" kern="1200">
+                <a:solidFill>
+                  <a:schemeClr val="tx1">
+                    <a:lumMod val="75000"/>
+                    <a:lumOff val="25000"/>
+                  </a:schemeClr>
+                </a:solidFill>
+                <a:latin typeface="+mn-lt"/>
+                <a:ea typeface="+mn-ea"/>
+                <a:cs typeface="+mn-cs"/>
+              </a:defRPr>
+            </a:lvl2pPr>
+            <a:lvl3pPr marL="1143000" indent="-228600" algn="l" defTabSz="457200" rtl="0" eaLnBrk="1" latinLnBrk="0" hangingPunct="1">
+              <a:spcBef>
+                <a:spcPts val="1000"/>
+              </a:spcBef>
+              <a:spcAft>
+                <a:spcPts val="0"/>
+              </a:spcAft>
+              <a:buClr>
+                <a:schemeClr val="accent1"/>
+              </a:buClr>
+              <a:buSzPct val="80000"/>
+              <a:buFont typeface="Wingdings 3" charset="2"/>
+              <a:buChar char=""/>
+              <a:defRPr sz="1400" kern="1200">
+                <a:solidFill>
+                  <a:schemeClr val="tx1">
+                    <a:lumMod val="75000"/>
+                    <a:lumOff val="25000"/>
+                  </a:schemeClr>
+                </a:solidFill>
+                <a:latin typeface="+mn-lt"/>
+                <a:ea typeface="+mn-ea"/>
+                <a:cs typeface="+mn-cs"/>
+              </a:defRPr>
+            </a:lvl3pPr>
+            <a:lvl4pPr marL="1600200" indent="-228600" algn="l" defTabSz="457200" rtl="0" eaLnBrk="1" latinLnBrk="0" hangingPunct="1">
+              <a:spcBef>
+                <a:spcPts val="1000"/>
+              </a:spcBef>
+              <a:spcAft>
+                <a:spcPts val="0"/>
+              </a:spcAft>
+              <a:buClr>
+                <a:schemeClr val="accent1"/>
+              </a:buClr>
+              <a:buSzPct val="80000"/>
+              <a:buFont typeface="Wingdings 3" charset="2"/>
+              <a:buChar char=""/>
+              <a:defRPr sz="1200" kern="1200">
+                <a:solidFill>
+                  <a:schemeClr val="tx1">
+                    <a:lumMod val="75000"/>
+                    <a:lumOff val="25000"/>
+                  </a:schemeClr>
+                </a:solidFill>
+                <a:latin typeface="+mn-lt"/>
+                <a:ea typeface="+mn-ea"/>
+                <a:cs typeface="+mn-cs"/>
+              </a:defRPr>
+            </a:lvl4pPr>
+            <a:lvl5pPr marL="2057400" indent="-228600" algn="l" defTabSz="457200" rtl="0" eaLnBrk="1" latinLnBrk="0" hangingPunct="1">
+              <a:spcBef>
+                <a:spcPts val="1000"/>
+              </a:spcBef>
+              <a:spcAft>
+                <a:spcPts val="0"/>
+              </a:spcAft>
+              <a:buClr>
+                <a:schemeClr val="accent1"/>
+              </a:buClr>
+              <a:buSzPct val="80000"/>
+              <a:buFont typeface="Wingdings 3" charset="2"/>
+              <a:buChar char=""/>
+              <a:defRPr sz="1200" kern="1200">
+                <a:solidFill>
+                  <a:schemeClr val="tx1">
+                    <a:lumMod val="75000"/>
+                    <a:lumOff val="25000"/>
+                  </a:schemeClr>
+                </a:solidFill>
+                <a:latin typeface="+mn-lt"/>
+                <a:ea typeface="+mn-ea"/>
+                <a:cs typeface="+mn-cs"/>
+              </a:defRPr>
+            </a:lvl5pPr>
+            <a:lvl6pPr marL="2514600" indent="-228600" algn="l" defTabSz="457200" rtl="0" eaLnBrk="1" latinLnBrk="0" hangingPunct="1">
+              <a:spcBef>
+                <a:spcPts val="1000"/>
+              </a:spcBef>
+              <a:spcAft>
+                <a:spcPts val="0"/>
+              </a:spcAft>
+              <a:buClr>
+                <a:schemeClr val="accent1"/>
+              </a:buClr>
+              <a:buSzPct val="80000"/>
+              <a:buFont typeface="Wingdings 3" charset="2"/>
+              <a:buChar char=""/>
+              <a:defRPr sz="1200" kern="1200">
+                <a:solidFill>
+                  <a:schemeClr val="tx1">
+                    <a:lumMod val="75000"/>
+                    <a:lumOff val="25000"/>
+                  </a:schemeClr>
+                </a:solidFill>
+                <a:latin typeface="+mn-lt"/>
+                <a:ea typeface="+mn-ea"/>
+                <a:cs typeface="+mn-cs"/>
+              </a:defRPr>
+            </a:lvl6pPr>
+            <a:lvl7pPr marL="2971800" indent="-228600" algn="l" defTabSz="457200" rtl="0" eaLnBrk="1" latinLnBrk="0" hangingPunct="1">
+              <a:spcBef>
+                <a:spcPts val="1000"/>
+              </a:spcBef>
+              <a:spcAft>
+                <a:spcPts val="0"/>
+              </a:spcAft>
+              <a:buClr>
+                <a:schemeClr val="accent1"/>
+              </a:buClr>
+              <a:buSzPct val="80000"/>
+              <a:buFont typeface="Wingdings 3" charset="2"/>
+              <a:buChar char=""/>
+              <a:defRPr sz="1200" kern="1200">
+                <a:solidFill>
+                  <a:schemeClr val="tx1">
+                    <a:lumMod val="75000"/>
+                    <a:lumOff val="25000"/>
+                  </a:schemeClr>
+                </a:solidFill>
+                <a:latin typeface="+mn-lt"/>
+                <a:ea typeface="+mn-ea"/>
+                <a:cs typeface="+mn-cs"/>
+              </a:defRPr>
+            </a:lvl7pPr>
+            <a:lvl8pPr marL="3429000" indent="-228600" algn="l" defTabSz="457200" rtl="0" eaLnBrk="1" latinLnBrk="0" hangingPunct="1">
+              <a:spcBef>
+                <a:spcPts val="1000"/>
+              </a:spcBef>
+              <a:spcAft>
+                <a:spcPts val="0"/>
+              </a:spcAft>
+              <a:buClr>
+                <a:schemeClr val="accent1"/>
+              </a:buClr>
+              <a:buSzPct val="80000"/>
+              <a:buFont typeface="Wingdings 3" charset="2"/>
+              <a:buChar char=""/>
+              <a:defRPr sz="1200" kern="1200">
+                <a:solidFill>
+                  <a:schemeClr val="tx1">
+                    <a:lumMod val="75000"/>
+                    <a:lumOff val="25000"/>
+                  </a:schemeClr>
+                </a:solidFill>
+                <a:latin typeface="+mn-lt"/>
+                <a:ea typeface="+mn-ea"/>
+                <a:cs typeface="+mn-cs"/>
+              </a:defRPr>
+            </a:lvl8pPr>
+            <a:lvl9pPr marL="3886200" indent="-228600" algn="l" defTabSz="457200" rtl="0" eaLnBrk="1" latinLnBrk="0" hangingPunct="1">
+              <a:spcBef>
+                <a:spcPts val="1000"/>
+              </a:spcBef>
+              <a:spcAft>
+                <a:spcPts val="0"/>
+              </a:spcAft>
+              <a:buClr>
+                <a:schemeClr val="accent1"/>
+              </a:buClr>
+              <a:buSzPct val="80000"/>
+              <a:buFont typeface="Wingdings 3" charset="2"/>
+              <a:buChar char=""/>
+              <a:defRPr sz="1200" kern="1200">
+                <a:solidFill>
+                  <a:schemeClr val="tx1">
+                    <a:lumMod val="75000"/>
+                    <a:lumOff val="25000"/>
+                  </a:schemeClr>
+                </a:solidFill>
+                <a:latin typeface="+mn-lt"/>
+                <a:ea typeface="+mn-ea"/>
+                <a:cs typeface="+mn-cs"/>
+              </a:defRPr>
+            </a:lvl9pPr>
+          </a:lstStyle>
+          <a:p>
+            <a:pPr lvl="1"/>
+            <a:r>
+              <a:rPr lang="en-US" sz="2000" dirty="0"/>
+              <a:t>Cost</a:t>
+            </a:r>
+          </a:p>
+          <a:p>
+            <a:pPr lvl="2"/>
+            <a:r>
+              <a:rPr lang="en-US" sz="1800" dirty="0"/>
+              <a:t>Attrition</a:t>
+            </a:r>
+          </a:p>
+          <a:p>
+            <a:pPr lvl="2"/>
+            <a:r>
+              <a:rPr lang="en-US" sz="1800" dirty="0"/>
+              <a:t>Productivity</a:t>
+            </a:r>
+          </a:p>
+          <a:p>
+            <a:pPr lvl="2"/>
+            <a:r>
+              <a:rPr lang="en-US" sz="1800" dirty="0"/>
+              <a:t>Training</a:t>
+            </a:r>
+          </a:p>
+          <a:p>
+            <a:pPr marL="457200" lvl="1" indent="0">
+              <a:buNone/>
+            </a:pPr>
+            <a:endParaRPr lang="en-US" sz="3000" dirty="0"/>
+          </a:p>
+          <a:p>
+            <a:endParaRPr lang="en-US" dirty="0">
+              <a:solidFill>
+                <a:srgbClr val="FFFFFF"/>
+              </a:solidFill>
+            </a:endParaRPr>
+          </a:p>
+        </p:txBody>
+      </p:sp>
+    </p:spTree>
+    <p:extLst>
+      <p:ext uri="{BB962C8B-B14F-4D97-AF65-F5344CB8AC3E}">
+        <p14:creationId xmlns:p14="http://schemas.microsoft.com/office/powerpoint/2010/main" val="3652629353"/>
+      </p:ext>
+    </p:extLst>
+  </p:cSld>
+  <p:clrMapOvr>
+    <a:overrideClrMapping bg1="dk1" tx1="lt1" bg2="dk2" tx2="lt2" accent1="accent1" accent2="accent2" accent3="accent3" accent4="accent4" accent5="accent5" accent6="accent6" hlink="hlink" folHlink="folHlink"/>
+  </p:clrMapOvr>
+</p:sld>
+</file>
+
+<file path=ppt/slides/slide3.xml><?xml version="1.0" encoding="utf-8"?>
+<p:sld xmlns:a="http://schemas.openxmlformats.org/drawingml/2006/main" xmlns:r="http://schemas.openxmlformats.org/officeDocument/2006/relationships" xmlns:p="http://schemas.openxmlformats.org/presentationml/2006/main">
+  <p:cSld>
+    <p:bg>
+      <p:bgPr>
+        <a:solidFill>
+          <a:schemeClr val="bg2"/>
+        </a:solidFill>
+        <a:effectLst/>
+      </p:bgPr>
+    </p:bg>
+    <p:spTree>
+      <p:nvGrpSpPr>
+        <p:cNvPr id="1" name=""/>
+        <p:cNvGrpSpPr/>
+        <p:nvPr/>
+      </p:nvGrpSpPr>
+      <p:grpSpPr>
+        <a:xfrm>
+          <a:off x="0" y="0"/>
+          <a:ext cx="0" cy="0"/>
+          <a:chOff x="0" y="0"/>
+          <a:chExt cx="0" cy="0"/>
+        </a:xfrm>
+      </p:grpSpPr>
+      <p:sp>
+        <p:nvSpPr>
+          <p:cNvPr id="2" name="Title 1">
+            <a:extLst>
+              <a:ext uri="{FF2B5EF4-FFF2-40B4-BE49-F238E27FC236}">
+                <a16:creationId xmlns:a16="http://schemas.microsoft.com/office/drawing/2014/main" id="{A571B95F-A299-4B67-94E7-E6673A47CB2E}"/>
+              </a:ext>
+            </a:extLst>
+          </p:cNvPr>
+          <p:cNvSpPr>
+            <a:spLocks noGrp="1"/>
+          </p:cNvSpPr>
+          <p:nvPr>
+            <p:ph type="title"/>
+          </p:nvPr>
+        </p:nvSpPr>
+        <p:spPr>
+          <a:xfrm>
+            <a:off x="1714615" y="683491"/>
+            <a:ext cx="3737268" cy="1320800"/>
+          </a:xfrm>
+        </p:spPr>
+        <p:txBody>
+          <a:bodyPr>
+            <a:normAutofit fontScale="90000"/>
+          </a:bodyPr>
+          <a:lstStyle/>
+          <a:p>
+            <a:r>
+              <a:rPr lang="en-US" dirty="0"/>
+              <a:t>Reducing attrition translates into:</a:t>
+            </a:r>
+          </a:p>
+        </p:txBody>
+      </p:sp>
+      <p:pic>
+        <p:nvPicPr>
+          <p:cNvPr id="5" name="Picture 4">
+            <a:extLst>
+              <a:ext uri="{FF2B5EF4-FFF2-40B4-BE49-F238E27FC236}">
+                <a16:creationId xmlns:a16="http://schemas.microsoft.com/office/drawing/2014/main" id="{02EFC4A6-F157-44A4-97DF-58D824A90F88}"/>
+              </a:ext>
+            </a:extLst>
+          </p:cNvPr>
+          <p:cNvPicPr>
+            <a:picLocks noChangeAspect="1"/>
+          </p:cNvPicPr>
+          <p:nvPr/>
+        </p:nvPicPr>
+        <p:blipFill rotWithShape="1">
+          <a:blip r:embed="rId2">
+            <a:extLst>
+              <a:ext uri="{28A0092B-C50C-407E-A947-70E740481C1C}">
+                <a14:useLocalDpi xmlns:a14="http://schemas.microsoft.com/office/drawing/2010/main" val="0"/>
+              </a:ext>
+            </a:extLst>
+          </a:blip>
+          <a:srcRect l="28473" r="27400" b="1"/>
+          <a:stretch/>
+        </p:blipFill>
+        <p:spPr>
+          <a:xfrm>
+            <a:off x="6576532" y="0"/>
+            <a:ext cx="5394940" cy="6858001"/>
+          </a:xfrm>
+          <a:custGeom>
+            <a:avLst/>
+            <a:gdLst/>
+            <a:ahLst/>
+            <a:cxnLst/>
+            <a:rect l="l" t="t" r="r" b="b"/>
+            <a:pathLst>
+              <a:path w="5394960" h="6858000">
+                <a:moveTo>
+                  <a:pt x="842596" y="0"/>
+                </a:moveTo>
+                <a:lnTo>
+                  <a:pt x="5394960" y="0"/>
+                </a:lnTo>
+                <a:lnTo>
+                  <a:pt x="5394960" y="21851"/>
+                </a:lnTo>
+                <a:lnTo>
+                  <a:pt x="4365943" y="6858000"/>
+                </a:lnTo>
+                <a:lnTo>
+                  <a:pt x="0" y="6858000"/>
+                </a:lnTo>
+                <a:lnTo>
+                  <a:pt x="0" y="5666154"/>
+                </a:lnTo>
+                <a:close/>
+              </a:path>
+            </a:pathLst>
+          </a:custGeom>
+        </p:spPr>
+      </p:pic>
+      <p:sp>
+        <p:nvSpPr>
+          <p:cNvPr id="53" name="Isosceles Triangle 14">
+            <a:extLst>
+              <a:ext uri="{FF2B5EF4-FFF2-40B4-BE49-F238E27FC236}">
+                <a16:creationId xmlns:a16="http://schemas.microsoft.com/office/drawing/2014/main" id="{3BCB5F6A-9EB0-40B0-9D13-3023E9A20508}"/>
+              </a:ext>
+              <a:ext uri="{C183D7F6-B498-43B3-948B-1728B52AA6E4}">
+                <adec:decorative xmlns:adec="http://schemas.microsoft.com/office/drawing/2017/decorative" val="1"/>
+              </a:ext>
+            </a:extLst>
+          </p:cNvPr>
+          <p:cNvSpPr>
+            <a:spLocks noGrp="1" noRot="1" noChangeAspect="1" noMove="1" noResize="1" noEditPoints="1" noAdjustHandles="1" noChangeArrowheads="1" noChangeShapeType="1" noTextEdit="1"/>
+          </p:cNvSpPr>
+          <p:nvPr>
+            <p:extLst>
+              <p:ext uri="{386F3935-93C4-4BCD-93E2-E3B085C9AB24}">
+                <p16:designElem xmlns:p16="http://schemas.microsoft.com/office/powerpoint/2015/main" val="1"/>
+              </p:ext>
+            </p:extLst>
+          </p:nvPr>
+        </p:nvSpPr>
+        <p:spPr>
+          <a:xfrm rot="10800000">
+            <a:off x="0" y="0"/>
+            <a:ext cx="842596" cy="5666154"/>
+          </a:xfrm>
+          <a:prstGeom prst="triangle">
+            <a:avLst>
+              <a:gd name="adj" fmla="val 100000"/>
+            </a:avLst>
+          </a:prstGeom>
+          <a:solidFill>
+            <a:schemeClr val="accent1"/>
+          </a:solidFill>
+          <a:ln>
+            <a:noFill/>
+          </a:ln>
+          <a:effectLst/>
+        </p:spPr>
+        <p:style>
+          <a:lnRef idx="1">
+            <a:schemeClr val="accent1"/>
+          </a:lnRef>
+          <a:fillRef idx="3">
+            <a:schemeClr val="accent1"/>
+          </a:fillRef>
+          <a:effectRef idx="2">
+            <a:schemeClr val="accent1"/>
+          </a:effectRef>
+          <a:fontRef idx="minor">
+            <a:schemeClr val="lt1"/>
+          </a:fontRef>
+        </p:style>
+      </p:sp>
+      <p:sp>
+        <p:nvSpPr>
+          <p:cNvPr id="38" name="Content Placeholder 2">
+            <a:extLst>
+              <a:ext uri="{FF2B5EF4-FFF2-40B4-BE49-F238E27FC236}">
+                <a16:creationId xmlns:a16="http://schemas.microsoft.com/office/drawing/2014/main" id="{50B6D3CE-BEF4-48B8-8DC8-0594141752C2}"/>
+              </a:ext>
+            </a:extLst>
+          </p:cNvPr>
+          <p:cNvSpPr txBox="1">
+            <a:spLocks/>
+          </p:cNvSpPr>
+          <p:nvPr/>
+        </p:nvSpPr>
+        <p:spPr>
+          <a:xfrm>
+            <a:off x="1677345" y="2293736"/>
+            <a:ext cx="4064439" cy="3880773"/>
+          </a:xfrm>
+          <a:prstGeom prst="rect">
+            <a:avLst/>
+          </a:prstGeom>
+        </p:spPr>
+        <p:txBody>
+          <a:bodyPr vert="horz" lIns="91440" tIns="45720" rIns="91440" bIns="45720" rtlCol="0">
+            <a:normAutofit/>
+          </a:bodyPr>
+          <a:lstStyle>
+            <a:lvl1pPr marL="342900" indent="-342900" algn="l" defTabSz="457200" rtl="0" eaLnBrk="1" latinLnBrk="0" hangingPunct="1">
+              <a:spcBef>
+                <a:spcPts val="1000"/>
+              </a:spcBef>
+              <a:spcAft>
+                <a:spcPts val="0"/>
+              </a:spcAft>
+              <a:buClr>
+                <a:schemeClr val="accent1"/>
+              </a:buClr>
+              <a:buSzPct val="80000"/>
+              <a:buFont typeface="Wingdings 3" charset="2"/>
+              <a:buChar char=""/>
+              <a:defRPr sz="1800" kern="1200">
+                <a:solidFill>
+                  <a:schemeClr val="tx1">
+                    <a:lumMod val="75000"/>
+                    <a:lumOff val="25000"/>
+                  </a:schemeClr>
+                </a:solidFill>
+                <a:latin typeface="+mn-lt"/>
+                <a:ea typeface="+mn-ea"/>
+                <a:cs typeface="+mn-cs"/>
+              </a:defRPr>
+            </a:lvl1pPr>
+            <a:lvl2pPr marL="742950" indent="-285750" algn="l" defTabSz="457200" rtl="0" eaLnBrk="1" latinLnBrk="0" hangingPunct="1">
+              <a:spcBef>
+                <a:spcPts val="1000"/>
+              </a:spcBef>
+              <a:spcAft>
+                <a:spcPts val="0"/>
+              </a:spcAft>
+              <a:buClr>
+                <a:schemeClr val="accent1"/>
+              </a:buClr>
+              <a:buSzPct val="80000"/>
+              <a:buFont typeface="Wingdings 3" charset="2"/>
+              <a:buChar char=""/>
+              <a:defRPr sz="1600" kern="1200">
+                <a:solidFill>
+                  <a:schemeClr val="tx1">
+                    <a:lumMod val="75000"/>
+                    <a:lumOff val="25000"/>
+                  </a:schemeClr>
+                </a:solidFill>
+                <a:latin typeface="+mn-lt"/>
+                <a:ea typeface="+mn-ea"/>
+                <a:cs typeface="+mn-cs"/>
+              </a:defRPr>
+            </a:lvl2pPr>
+            <a:lvl3pPr marL="1143000" indent="-228600" algn="l" defTabSz="457200" rtl="0" eaLnBrk="1" latinLnBrk="0" hangingPunct="1">
+              <a:spcBef>
+                <a:spcPts val="1000"/>
+              </a:spcBef>
+              <a:spcAft>
+                <a:spcPts val="0"/>
+              </a:spcAft>
+              <a:buClr>
+                <a:schemeClr val="accent1"/>
+              </a:buClr>
+              <a:buSzPct val="80000"/>
+              <a:buFont typeface="Wingdings 3" charset="2"/>
+              <a:buChar char=""/>
+              <a:defRPr sz="1400" kern="1200">
+                <a:solidFill>
+                  <a:schemeClr val="tx1">
+                    <a:lumMod val="75000"/>
+                    <a:lumOff val="25000"/>
+                  </a:schemeClr>
+                </a:solidFill>
+                <a:latin typeface="+mn-lt"/>
+                <a:ea typeface="+mn-ea"/>
+                <a:cs typeface="+mn-cs"/>
+              </a:defRPr>
+            </a:lvl3pPr>
+            <a:lvl4pPr marL="1600200" indent="-228600" algn="l" defTabSz="457200" rtl="0" eaLnBrk="1" latinLnBrk="0" hangingPunct="1">
+              <a:spcBef>
+                <a:spcPts val="1000"/>
+              </a:spcBef>
+              <a:spcAft>
+                <a:spcPts val="0"/>
+              </a:spcAft>
+              <a:buClr>
+                <a:schemeClr val="accent1"/>
+              </a:buClr>
+              <a:buSzPct val="80000"/>
+              <a:buFont typeface="Wingdings 3" charset="2"/>
+              <a:buChar char=""/>
+              <a:defRPr sz="1200" kern="1200">
+                <a:solidFill>
+                  <a:schemeClr val="tx1">
+                    <a:lumMod val="75000"/>
+                    <a:lumOff val="25000"/>
+                  </a:schemeClr>
+                </a:solidFill>
+                <a:latin typeface="+mn-lt"/>
+                <a:ea typeface="+mn-ea"/>
+                <a:cs typeface="+mn-cs"/>
+              </a:defRPr>
+            </a:lvl4pPr>
+            <a:lvl5pPr marL="2057400" indent="-228600" algn="l" defTabSz="457200" rtl="0" eaLnBrk="1" latinLnBrk="0" hangingPunct="1">
+              <a:spcBef>
+                <a:spcPts val="1000"/>
+              </a:spcBef>
+              <a:spcAft>
+                <a:spcPts val="0"/>
+              </a:spcAft>
+              <a:buClr>
+                <a:schemeClr val="accent1"/>
+              </a:buClr>
+              <a:buSzPct val="80000"/>
+              <a:buFont typeface="Wingdings 3" charset="2"/>
+              <a:buChar char=""/>
+              <a:defRPr sz="1200" kern="1200">
+                <a:solidFill>
+                  <a:schemeClr val="tx1">
+                    <a:lumMod val="75000"/>
+                    <a:lumOff val="25000"/>
+                  </a:schemeClr>
+                </a:solidFill>
+                <a:latin typeface="+mn-lt"/>
+                <a:ea typeface="+mn-ea"/>
+                <a:cs typeface="+mn-cs"/>
+              </a:defRPr>
+            </a:lvl5pPr>
+            <a:lvl6pPr marL="2514600" indent="-228600" algn="l" defTabSz="457200" rtl="0" eaLnBrk="1" latinLnBrk="0" hangingPunct="1">
+              <a:spcBef>
+                <a:spcPts val="1000"/>
+              </a:spcBef>
+              <a:spcAft>
+                <a:spcPts val="0"/>
+              </a:spcAft>
+              <a:buClr>
+                <a:schemeClr val="accent1"/>
+              </a:buClr>
+              <a:buSzPct val="80000"/>
+              <a:buFont typeface="Wingdings 3" charset="2"/>
+              <a:buChar char=""/>
+              <a:defRPr sz="1200" kern="1200">
+                <a:solidFill>
+                  <a:schemeClr val="tx1">
+                    <a:lumMod val="75000"/>
+                    <a:lumOff val="25000"/>
+                  </a:schemeClr>
+                </a:solidFill>
+                <a:latin typeface="+mn-lt"/>
+                <a:ea typeface="+mn-ea"/>
+                <a:cs typeface="+mn-cs"/>
+              </a:defRPr>
+            </a:lvl6pPr>
+            <a:lvl7pPr marL="2971800" indent="-228600" algn="l" defTabSz="457200" rtl="0" eaLnBrk="1" latinLnBrk="0" hangingPunct="1">
+              <a:spcBef>
+                <a:spcPts val="1000"/>
+              </a:spcBef>
+              <a:spcAft>
+                <a:spcPts val="0"/>
+              </a:spcAft>
+              <a:buClr>
+                <a:schemeClr val="accent1"/>
+              </a:buClr>
+              <a:buSzPct val="80000"/>
+              <a:buFont typeface="Wingdings 3" charset="2"/>
+              <a:buChar char=""/>
+              <a:defRPr sz="1200" kern="1200">
+                <a:solidFill>
+                  <a:schemeClr val="tx1">
+                    <a:lumMod val="75000"/>
+                    <a:lumOff val="25000"/>
+                  </a:schemeClr>
+                </a:solidFill>
+                <a:latin typeface="+mn-lt"/>
+                <a:ea typeface="+mn-ea"/>
+                <a:cs typeface="+mn-cs"/>
+              </a:defRPr>
+            </a:lvl7pPr>
+            <a:lvl8pPr marL="3429000" indent="-228600" algn="l" defTabSz="457200" rtl="0" eaLnBrk="1" latinLnBrk="0" hangingPunct="1">
+              <a:spcBef>
+                <a:spcPts val="1000"/>
+              </a:spcBef>
+              <a:spcAft>
+                <a:spcPts val="0"/>
+              </a:spcAft>
+              <a:buClr>
+                <a:schemeClr val="accent1"/>
+              </a:buClr>
+              <a:buSzPct val="80000"/>
+              <a:buFont typeface="Wingdings 3" charset="2"/>
+              <a:buChar char=""/>
+              <a:defRPr sz="1200" kern="1200">
+                <a:solidFill>
+                  <a:schemeClr val="tx1">
+                    <a:lumMod val="75000"/>
+                    <a:lumOff val="25000"/>
+                  </a:schemeClr>
+                </a:solidFill>
+                <a:latin typeface="+mn-lt"/>
+                <a:ea typeface="+mn-ea"/>
+                <a:cs typeface="+mn-cs"/>
+              </a:defRPr>
+            </a:lvl8pPr>
+            <a:lvl9pPr marL="3886200" indent="-228600" algn="l" defTabSz="457200" rtl="0" eaLnBrk="1" latinLnBrk="0" hangingPunct="1">
+              <a:spcBef>
+                <a:spcPts val="1000"/>
+              </a:spcBef>
+              <a:spcAft>
+                <a:spcPts val="0"/>
+              </a:spcAft>
+              <a:buClr>
+                <a:schemeClr val="accent1"/>
+              </a:buClr>
+              <a:buSzPct val="80000"/>
+              <a:buFont typeface="Wingdings 3" charset="2"/>
+              <a:buChar char=""/>
+              <a:defRPr sz="1200" kern="1200">
+                <a:solidFill>
+                  <a:schemeClr val="tx1">
+                    <a:lumMod val="75000"/>
+                    <a:lumOff val="25000"/>
+                  </a:schemeClr>
+                </a:solidFill>
+                <a:latin typeface="+mn-lt"/>
+                <a:ea typeface="+mn-ea"/>
+                <a:cs typeface="+mn-cs"/>
+              </a:defRPr>
+            </a:lvl9pPr>
+          </a:lstStyle>
+          <a:p>
             <a:r>
               <a:rPr lang="en-US" dirty="0">
                 <a:latin typeface="Proxima Nova"/>
@@ -8232,21 +8764,21 @@
           <a:chExt cx="0" cy="0"/>
         </a:xfrm>
       </p:grpSpPr>
-      <p:sp useBgFill="1">
-        <p:nvSpPr>
-          <p:cNvPr id="32" name="Rectangle 31">
+      <p:grpSp>
+        <p:nvGrpSpPr>
+          <p:cNvPr id="43" name="Group 42">
             <a:extLst>
               <a:ext uri="{FF2B5EF4-FFF2-40B4-BE49-F238E27FC236}">
-                <a16:creationId xmlns:a16="http://schemas.microsoft.com/office/drawing/2014/main" id="{9F4444CE-BC8D-4D61-B303-4C05614E62AB}"/>
+                <a16:creationId xmlns:a16="http://schemas.microsoft.com/office/drawing/2014/main" id="{B4DE830A-B531-4A3B-96F6-0ECE88B08555}"/>
               </a:ext>
               <a:ext uri="{C183D7F6-B498-43B3-948B-1728B52AA6E4}">
                 <adec:decorative xmlns:adec="http://schemas.microsoft.com/office/drawing/2017/decorative" val="1"/>
               </a:ext>
             </a:extLst>
           </p:cNvPr>
-          <p:cNvSpPr>
-            <a:spLocks noGrp="1" noRot="1" noChangeAspect="1" noMove="1" noResize="1" noEditPoints="1" noAdjustHandles="1" noChangeArrowheads="1" noChangeShapeType="1" noTextEdit="1"/>
-          </p:cNvSpPr>
+          <p:cNvGrpSpPr>
+            <a:grpSpLocks noGrp="1" noUngrp="1" noRot="1" noChangeAspect="1" noMove="1" noResize="1"/>
+          </p:cNvGrpSpPr>
           <p:nvPr>
             <p:extLst>
               <p:ext uri="{386F3935-93C4-4BCD-93E2-E3B085C9AB24}">
@@ -8254,168 +8786,681 @@
               </p:ext>
             </p:extLst>
           </p:nvPr>
-        </p:nvSpPr>
-        <p:spPr>
+        </p:nvGrpSpPr>
+        <p:grpSpPr>
           <a:xfrm>
-            <a:off x="0" y="0"/>
-            <a:ext cx="12192000" cy="6858000"/>
+            <a:off x="0" y="-8467"/>
+            <a:ext cx="12192000" cy="6866467"/>
+            <a:chOff x="0" y="-8467"/>
+            <a:chExt cx="12192000" cy="6866467"/>
           </a:xfrm>
-          <a:prstGeom prst="rect">
-            <a:avLst/>
-          </a:prstGeom>
-          <a:ln>
-            <a:noFill/>
-          </a:ln>
-        </p:spPr>
-        <p:style>
-          <a:lnRef idx="2">
-            <a:schemeClr val="accent1">
-              <a:shade val="50000"/>
-            </a:schemeClr>
-          </a:lnRef>
-          <a:fillRef idx="1">
-            <a:schemeClr val="accent1"/>
-          </a:fillRef>
-          <a:effectRef idx="0">
-            <a:schemeClr val="accent1"/>
-          </a:effectRef>
-          <a:fontRef idx="minor">
-            <a:schemeClr val="lt1"/>
-          </a:fontRef>
-        </p:style>
-        <p:txBody>
-          <a:bodyPr rtlCol="0" anchor="ctr"/>
-          <a:lstStyle/>
-          <a:p>
-            <a:pPr algn="ctr"/>
-            <a:endParaRPr lang="en-US"/>
-          </a:p>
-        </p:txBody>
-      </p:sp>
-      <p:sp>
-        <p:nvSpPr>
-          <p:cNvPr id="34" name="Rectangle 33">
-            <a:extLst>
-              <a:ext uri="{FF2B5EF4-FFF2-40B4-BE49-F238E27FC236}">
-                <a16:creationId xmlns:a16="http://schemas.microsoft.com/office/drawing/2014/main" id="{62423CA5-E2E1-4789-B759-9906C1C94063}"/>
-              </a:ext>
-              <a:ext uri="{C183D7F6-B498-43B3-948B-1728B52AA6E4}">
-                <adec:decorative xmlns:adec="http://schemas.microsoft.com/office/drawing/2017/decorative" val="1"/>
-              </a:ext>
-            </a:extLst>
-          </p:cNvPr>
-          <p:cNvSpPr>
-            <a:spLocks noGrp="1" noRot="1" noChangeAspect="1" noMove="1" noResize="1" noEditPoints="1" noAdjustHandles="1" noChangeArrowheads="1" noChangeShapeType="1" noTextEdit="1"/>
-          </p:cNvSpPr>
-          <p:nvPr>
-            <p:extLst>
-              <p:ext uri="{386F3935-93C4-4BCD-93E2-E3B085C9AB24}">
-                <p16:designElem xmlns:p16="http://schemas.microsoft.com/office/powerpoint/2015/main" val="1"/>
-              </p:ext>
-            </p:extLst>
-          </p:nvPr>
-        </p:nvSpPr>
-        <p:spPr>
-          <a:xfrm>
-            <a:off x="0" y="-3"/>
-            <a:ext cx="4660126" cy="6858000"/>
-          </a:xfrm>
-          <a:prstGeom prst="rect">
-            <a:avLst/>
-          </a:prstGeom>
-          <a:solidFill>
-            <a:schemeClr val="tx2"/>
-          </a:solidFill>
-          <a:ln>
-            <a:noFill/>
-          </a:ln>
-          <a:effectLst/>
-        </p:spPr>
-        <p:style>
-          <a:lnRef idx="1">
-            <a:schemeClr val="accent1"/>
-          </a:lnRef>
-          <a:fillRef idx="3">
-            <a:schemeClr val="accent1"/>
-          </a:fillRef>
-          <a:effectRef idx="2">
-            <a:schemeClr val="accent1"/>
-          </a:effectRef>
-          <a:fontRef idx="minor">
-            <a:schemeClr val="lt1"/>
-          </a:fontRef>
-        </p:style>
-        <p:txBody>
-          <a:bodyPr/>
-          <a:lstStyle/>
-          <a:p>
-            <a:endParaRPr lang="en-US"/>
-          </a:p>
-        </p:txBody>
-      </p:sp>
-      <p:sp>
-        <p:nvSpPr>
-          <p:cNvPr id="36" name="Isosceles Triangle 35">
-            <a:extLst>
-              <a:ext uri="{FF2B5EF4-FFF2-40B4-BE49-F238E27FC236}">
-                <a16:creationId xmlns:a16="http://schemas.microsoft.com/office/drawing/2014/main" id="{73772B81-181F-48B7-8826-4D9686D15DF5}"/>
-              </a:ext>
-              <a:ext uri="{C183D7F6-B498-43B3-948B-1728B52AA6E4}">
-                <adec:decorative xmlns:adec="http://schemas.microsoft.com/office/drawing/2017/decorative" val="1"/>
-              </a:ext>
-            </a:extLst>
-          </p:cNvPr>
-          <p:cNvSpPr>
-            <a:spLocks noGrp="1" noRot="1" noChangeAspect="1" noMove="1" noResize="1" noEditPoints="1" noAdjustHandles="1" noChangeArrowheads="1" noChangeShapeType="1" noTextEdit="1"/>
-          </p:cNvSpPr>
-          <p:nvPr>
-            <p:extLst>
-              <p:ext uri="{386F3935-93C4-4BCD-93E2-E3B085C9AB24}">
-                <p16:designElem xmlns:p16="http://schemas.microsoft.com/office/powerpoint/2015/main" val="1"/>
-              </p:ext>
-            </p:extLst>
-          </p:nvPr>
-        </p:nvSpPr>
-        <p:spPr>
-          <a:xfrm rot="10800000">
-            <a:off x="4660127" y="-3"/>
-            <a:ext cx="1056745" cy="6858001"/>
-          </a:xfrm>
-          <a:prstGeom prst="triangle">
-            <a:avLst>
-              <a:gd name="adj" fmla="val 100000"/>
-            </a:avLst>
-          </a:prstGeom>
-          <a:solidFill>
-            <a:schemeClr val="tx2"/>
-          </a:solidFill>
-          <a:ln>
-            <a:noFill/>
-          </a:ln>
-          <a:effectLst/>
-        </p:spPr>
-        <p:style>
-          <a:lnRef idx="1">
-            <a:schemeClr val="accent1"/>
-          </a:lnRef>
-          <a:fillRef idx="3">
-            <a:schemeClr val="accent1"/>
-          </a:fillRef>
-          <a:effectRef idx="2">
-            <a:schemeClr val="accent1"/>
-          </a:effectRef>
-          <a:fontRef idx="minor">
-            <a:schemeClr val="lt1"/>
-          </a:fontRef>
-        </p:style>
-        <p:txBody>
-          <a:bodyPr/>
-          <a:lstStyle/>
-          <a:p>
-            <a:endParaRPr lang="en-US" dirty="0"/>
-          </a:p>
-        </p:txBody>
-      </p:sp>
+        </p:grpSpPr>
+        <p:cxnSp>
+          <p:nvCxnSpPr>
+            <p:cNvPr id="44" name="Straight Connector 43">
+              <a:extLst>
+                <a:ext uri="{FF2B5EF4-FFF2-40B4-BE49-F238E27FC236}">
+                  <a16:creationId xmlns:a16="http://schemas.microsoft.com/office/drawing/2014/main" id="{2813DF2C-461A-4A8F-9679-A172790D1F3A}"/>
+                </a:ext>
+                <a:ext uri="{C183D7F6-B498-43B3-948B-1728B52AA6E4}">
+                  <adec:decorative xmlns:adec="http://schemas.microsoft.com/office/drawing/2017/decorative" val="1"/>
+                </a:ext>
+              </a:extLst>
+            </p:cNvPr>
+            <p:cNvCxnSpPr/>
+            <p:nvPr>
+              <p:extLst>
+                <p:ext uri="{386F3935-93C4-4BCD-93E2-E3B085C9AB24}">
+                  <p16:designElem xmlns:p16="http://schemas.microsoft.com/office/powerpoint/2015/main" val="1"/>
+                </p:ext>
+              </p:extLst>
+            </p:nvPr>
+          </p:nvCxnSpPr>
+          <p:spPr>
+            <a:xfrm>
+              <a:off x="9371012" y="0"/>
+              <a:ext cx="1219200" cy="6858000"/>
+            </a:xfrm>
+            <a:prstGeom prst="line">
+              <a:avLst/>
+            </a:prstGeom>
+            <a:ln w="9525">
+              <a:solidFill>
+                <a:schemeClr val="bg1">
+                  <a:lumMod val="75000"/>
+                </a:schemeClr>
+              </a:solidFill>
+            </a:ln>
+          </p:spPr>
+          <p:style>
+            <a:lnRef idx="2">
+              <a:schemeClr val="accent1"/>
+            </a:lnRef>
+            <a:fillRef idx="0">
+              <a:schemeClr val="accent1"/>
+            </a:fillRef>
+            <a:effectRef idx="1">
+              <a:schemeClr val="accent1"/>
+            </a:effectRef>
+            <a:fontRef idx="minor">
+              <a:schemeClr val="tx1"/>
+            </a:fontRef>
+          </p:style>
+        </p:cxnSp>
+        <p:cxnSp>
+          <p:nvCxnSpPr>
+            <p:cNvPr id="45" name="Straight Connector 44">
+              <a:extLst>
+                <a:ext uri="{FF2B5EF4-FFF2-40B4-BE49-F238E27FC236}">
+                  <a16:creationId xmlns:a16="http://schemas.microsoft.com/office/drawing/2014/main" id="{54CD3A85-C039-4249-86E4-1EB9318B5495}"/>
+                </a:ext>
+                <a:ext uri="{C183D7F6-B498-43B3-948B-1728B52AA6E4}">
+                  <adec:decorative xmlns:adec="http://schemas.microsoft.com/office/drawing/2017/decorative" val="1"/>
+                </a:ext>
+              </a:extLst>
+            </p:cNvPr>
+            <p:cNvCxnSpPr/>
+            <p:nvPr>
+              <p:extLst>
+                <p:ext uri="{386F3935-93C4-4BCD-93E2-E3B085C9AB24}">
+                  <p16:designElem xmlns:p16="http://schemas.microsoft.com/office/powerpoint/2015/main" val="1"/>
+                </p:ext>
+              </p:extLst>
+            </p:nvPr>
+          </p:nvCxnSpPr>
+          <p:spPr>
+            <a:xfrm flipH="1">
+              <a:off x="7425267" y="3681413"/>
+              <a:ext cx="4763558" cy="3176587"/>
+            </a:xfrm>
+            <a:prstGeom prst="line">
+              <a:avLst/>
+            </a:prstGeom>
+            <a:ln w="9525">
+              <a:solidFill>
+                <a:schemeClr val="bg1">
+                  <a:lumMod val="85000"/>
+                </a:schemeClr>
+              </a:solidFill>
+            </a:ln>
+          </p:spPr>
+          <p:style>
+            <a:lnRef idx="2">
+              <a:schemeClr val="accent1"/>
+            </a:lnRef>
+            <a:fillRef idx="0">
+              <a:schemeClr val="accent1"/>
+            </a:fillRef>
+            <a:effectRef idx="1">
+              <a:schemeClr val="accent1"/>
+            </a:effectRef>
+            <a:fontRef idx="minor">
+              <a:schemeClr val="tx1"/>
+            </a:fontRef>
+          </p:style>
+        </p:cxnSp>
+        <p:sp>
+          <p:nvSpPr>
+            <p:cNvPr id="46" name="Rectangle 23">
+              <a:extLst>
+                <a:ext uri="{FF2B5EF4-FFF2-40B4-BE49-F238E27FC236}">
+                  <a16:creationId xmlns:a16="http://schemas.microsoft.com/office/drawing/2014/main" id="{887EA6D2-2883-42C2-993D-094CA6D65DA3}"/>
+                </a:ext>
+                <a:ext uri="{C183D7F6-B498-43B3-948B-1728B52AA6E4}">
+                  <adec:decorative xmlns:adec="http://schemas.microsoft.com/office/drawing/2017/decorative" val="1"/>
+                </a:ext>
+              </a:extLst>
+            </p:cNvPr>
+            <p:cNvSpPr/>
+            <p:nvPr>
+              <p:extLst>
+                <p:ext uri="{386F3935-93C4-4BCD-93E2-E3B085C9AB24}">
+                  <p16:designElem xmlns:p16="http://schemas.microsoft.com/office/powerpoint/2015/main" val="1"/>
+                </p:ext>
+              </p:extLst>
+            </p:nvPr>
+          </p:nvSpPr>
+          <p:spPr>
+            <a:xfrm>
+              <a:off x="9181476" y="-8467"/>
+              <a:ext cx="3007349" cy="6866467"/>
+            </a:xfrm>
+            <a:custGeom>
+              <a:avLst/>
+              <a:gdLst/>
+              <a:ahLst/>
+              <a:cxnLst/>
+              <a:rect l="l" t="t" r="r" b="b"/>
+              <a:pathLst>
+                <a:path w="3007349" h="6866467">
+                  <a:moveTo>
+                    <a:pt x="2045532" y="0"/>
+                  </a:moveTo>
+                  <a:lnTo>
+                    <a:pt x="3007349" y="0"/>
+                  </a:lnTo>
+                  <a:lnTo>
+                    <a:pt x="3007349" y="6866467"/>
+                  </a:lnTo>
+                  <a:lnTo>
+                    <a:pt x="0" y="6866467"/>
+                  </a:lnTo>
+                  <a:lnTo>
+                    <a:pt x="2045532" y="0"/>
+                  </a:lnTo>
+                  <a:close/>
+                </a:path>
+              </a:pathLst>
+            </a:custGeom>
+            <a:solidFill>
+              <a:schemeClr val="accent1">
+                <a:alpha val="30000"/>
+              </a:schemeClr>
+            </a:solidFill>
+            <a:ln>
+              <a:noFill/>
+            </a:ln>
+            <a:effectLst/>
+          </p:spPr>
+          <p:style>
+            <a:lnRef idx="1">
+              <a:schemeClr val="accent1"/>
+            </a:lnRef>
+            <a:fillRef idx="3">
+              <a:schemeClr val="accent1"/>
+            </a:fillRef>
+            <a:effectRef idx="2">
+              <a:schemeClr val="accent1"/>
+            </a:effectRef>
+            <a:fontRef idx="minor">
+              <a:schemeClr val="lt1"/>
+            </a:fontRef>
+          </p:style>
+        </p:sp>
+        <p:sp>
+          <p:nvSpPr>
+            <p:cNvPr id="47" name="Rectangle 25">
+              <a:extLst>
+                <a:ext uri="{FF2B5EF4-FFF2-40B4-BE49-F238E27FC236}">
+                  <a16:creationId xmlns:a16="http://schemas.microsoft.com/office/drawing/2014/main" id="{3B895046-636F-4D1B-ACA4-29AA0CB3329F}"/>
+                </a:ext>
+                <a:ext uri="{C183D7F6-B498-43B3-948B-1728B52AA6E4}">
+                  <adec:decorative xmlns:adec="http://schemas.microsoft.com/office/drawing/2017/decorative" val="1"/>
+                </a:ext>
+              </a:extLst>
+            </p:cNvPr>
+            <p:cNvSpPr/>
+            <p:nvPr>
+              <p:extLst>
+                <p:ext uri="{386F3935-93C4-4BCD-93E2-E3B085C9AB24}">
+                  <p16:designElem xmlns:p16="http://schemas.microsoft.com/office/powerpoint/2015/main" val="1"/>
+                </p:ext>
+              </p:extLst>
+            </p:nvPr>
+          </p:nvSpPr>
+          <p:spPr>
+            <a:xfrm>
+              <a:off x="9603442" y="-8467"/>
+              <a:ext cx="2588558" cy="6866467"/>
+            </a:xfrm>
+            <a:custGeom>
+              <a:avLst/>
+              <a:gdLst/>
+              <a:ahLst/>
+              <a:cxnLst/>
+              <a:rect l="l" t="t" r="r" b="b"/>
+              <a:pathLst>
+                <a:path w="2573311" h="6866467">
+                  <a:moveTo>
+                    <a:pt x="0" y="0"/>
+                  </a:moveTo>
+                  <a:lnTo>
+                    <a:pt x="2573311" y="0"/>
+                  </a:lnTo>
+                  <a:lnTo>
+                    <a:pt x="2573311" y="6866467"/>
+                  </a:lnTo>
+                  <a:lnTo>
+                    <a:pt x="1202336" y="6866467"/>
+                  </a:lnTo>
+                  <a:lnTo>
+                    <a:pt x="0" y="0"/>
+                  </a:lnTo>
+                  <a:close/>
+                </a:path>
+              </a:pathLst>
+            </a:custGeom>
+            <a:solidFill>
+              <a:schemeClr val="accent1">
+                <a:alpha val="20000"/>
+              </a:schemeClr>
+            </a:solidFill>
+            <a:ln>
+              <a:noFill/>
+            </a:ln>
+            <a:effectLst/>
+          </p:spPr>
+          <p:style>
+            <a:lnRef idx="1">
+              <a:schemeClr val="accent1"/>
+            </a:lnRef>
+            <a:fillRef idx="3">
+              <a:schemeClr val="accent1"/>
+            </a:fillRef>
+            <a:effectRef idx="2">
+              <a:schemeClr val="accent1"/>
+            </a:effectRef>
+            <a:fontRef idx="minor">
+              <a:schemeClr val="lt1"/>
+            </a:fontRef>
+          </p:style>
+        </p:sp>
+        <p:sp>
+          <p:nvSpPr>
+            <p:cNvPr id="48" name="Isosceles Triangle 47">
+              <a:extLst>
+                <a:ext uri="{FF2B5EF4-FFF2-40B4-BE49-F238E27FC236}">
+                  <a16:creationId xmlns:a16="http://schemas.microsoft.com/office/drawing/2014/main" id="{C6B0CDE3-E054-4EDD-A43B-F96843D8BF51}"/>
+                </a:ext>
+                <a:ext uri="{C183D7F6-B498-43B3-948B-1728B52AA6E4}">
+                  <adec:decorative xmlns:adec="http://schemas.microsoft.com/office/drawing/2017/decorative" val="1"/>
+                </a:ext>
+              </a:extLst>
+            </p:cNvPr>
+            <p:cNvSpPr/>
+            <p:nvPr>
+              <p:extLst>
+                <p:ext uri="{386F3935-93C4-4BCD-93E2-E3B085C9AB24}">
+                  <p16:designElem xmlns:p16="http://schemas.microsoft.com/office/powerpoint/2015/main" val="1"/>
+                </p:ext>
+              </p:extLst>
+            </p:nvPr>
+          </p:nvSpPr>
+          <p:spPr>
+            <a:xfrm>
+              <a:off x="8932333" y="3048000"/>
+              <a:ext cx="3259667" cy="3810000"/>
+            </a:xfrm>
+            <a:prstGeom prst="triangle">
+              <a:avLst>
+                <a:gd name="adj" fmla="val 100000"/>
+              </a:avLst>
+            </a:prstGeom>
+            <a:solidFill>
+              <a:schemeClr val="accent2">
+                <a:alpha val="72000"/>
+              </a:schemeClr>
+            </a:solidFill>
+            <a:ln>
+              <a:noFill/>
+            </a:ln>
+            <a:effectLst/>
+          </p:spPr>
+          <p:style>
+            <a:lnRef idx="1">
+              <a:schemeClr val="accent1"/>
+            </a:lnRef>
+            <a:fillRef idx="3">
+              <a:schemeClr val="accent1"/>
+            </a:fillRef>
+            <a:effectRef idx="2">
+              <a:schemeClr val="accent1"/>
+            </a:effectRef>
+            <a:fontRef idx="minor">
+              <a:schemeClr val="lt1"/>
+            </a:fontRef>
+          </p:style>
+        </p:sp>
+        <p:sp>
+          <p:nvSpPr>
+            <p:cNvPr id="49" name="Rectangle 27">
+              <a:extLst>
+                <a:ext uri="{FF2B5EF4-FFF2-40B4-BE49-F238E27FC236}">
+                  <a16:creationId xmlns:a16="http://schemas.microsoft.com/office/drawing/2014/main" id="{3B66B1A2-F145-4C9B-85CC-4BF30D58CBC5}"/>
+                </a:ext>
+                <a:ext uri="{C183D7F6-B498-43B3-948B-1728B52AA6E4}">
+                  <adec:decorative xmlns:adec="http://schemas.microsoft.com/office/drawing/2017/decorative" val="1"/>
+                </a:ext>
+              </a:extLst>
+            </p:cNvPr>
+            <p:cNvSpPr/>
+            <p:nvPr>
+              <p:extLst>
+                <p:ext uri="{386F3935-93C4-4BCD-93E2-E3B085C9AB24}">
+                  <p16:designElem xmlns:p16="http://schemas.microsoft.com/office/powerpoint/2015/main" val="1"/>
+                </p:ext>
+              </p:extLst>
+            </p:nvPr>
+          </p:nvSpPr>
+          <p:spPr>
+            <a:xfrm>
+              <a:off x="9334500" y="-8467"/>
+              <a:ext cx="2854326" cy="6866467"/>
+            </a:xfrm>
+            <a:custGeom>
+              <a:avLst/>
+              <a:gdLst/>
+              <a:ahLst/>
+              <a:cxnLst/>
+              <a:rect l="l" t="t" r="r" b="b"/>
+              <a:pathLst>
+                <a:path w="2858013" h="6866467">
+                  <a:moveTo>
+                    <a:pt x="0" y="0"/>
+                  </a:moveTo>
+                  <a:lnTo>
+                    <a:pt x="2858013" y="0"/>
+                  </a:lnTo>
+                  <a:lnTo>
+                    <a:pt x="2858013" y="6866467"/>
+                  </a:lnTo>
+                  <a:lnTo>
+                    <a:pt x="2473942" y="6866467"/>
+                  </a:lnTo>
+                  <a:lnTo>
+                    <a:pt x="0" y="0"/>
+                  </a:lnTo>
+                  <a:close/>
+                </a:path>
+              </a:pathLst>
+            </a:custGeom>
+            <a:solidFill>
+              <a:schemeClr val="accent2">
+                <a:lumMod val="75000"/>
+                <a:alpha val="70000"/>
+              </a:schemeClr>
+            </a:solidFill>
+            <a:ln>
+              <a:noFill/>
+            </a:ln>
+            <a:effectLst/>
+          </p:spPr>
+          <p:style>
+            <a:lnRef idx="1">
+              <a:schemeClr val="accent1"/>
+            </a:lnRef>
+            <a:fillRef idx="3">
+              <a:schemeClr val="accent1"/>
+            </a:fillRef>
+            <a:effectRef idx="2">
+              <a:schemeClr val="accent1"/>
+            </a:effectRef>
+            <a:fontRef idx="minor">
+              <a:schemeClr val="lt1"/>
+            </a:fontRef>
+          </p:style>
+        </p:sp>
+        <p:sp>
+          <p:nvSpPr>
+            <p:cNvPr id="50" name="Rectangle 28">
+              <a:extLst>
+                <a:ext uri="{FF2B5EF4-FFF2-40B4-BE49-F238E27FC236}">
+                  <a16:creationId xmlns:a16="http://schemas.microsoft.com/office/drawing/2014/main" id="{5D4FC972-94B3-4035-8D31-E668C132B411}"/>
+                </a:ext>
+                <a:ext uri="{C183D7F6-B498-43B3-948B-1728B52AA6E4}">
+                  <adec:decorative xmlns:adec="http://schemas.microsoft.com/office/drawing/2017/decorative" val="1"/>
+                </a:ext>
+              </a:extLst>
+            </p:cNvPr>
+            <p:cNvSpPr/>
+            <p:nvPr>
+              <p:extLst>
+                <p:ext uri="{386F3935-93C4-4BCD-93E2-E3B085C9AB24}">
+                  <p16:designElem xmlns:p16="http://schemas.microsoft.com/office/powerpoint/2015/main" val="1"/>
+                </p:ext>
+              </p:extLst>
+            </p:nvPr>
+          </p:nvSpPr>
+          <p:spPr>
+            <a:xfrm>
+              <a:off x="10898730" y="-8467"/>
+              <a:ext cx="1290094" cy="6866467"/>
+            </a:xfrm>
+            <a:custGeom>
+              <a:avLst/>
+              <a:gdLst/>
+              <a:ahLst/>
+              <a:cxnLst/>
+              <a:rect l="l" t="t" r="r" b="b"/>
+              <a:pathLst>
+                <a:path w="1290094" h="6858000">
+                  <a:moveTo>
+                    <a:pt x="1019735" y="0"/>
+                  </a:moveTo>
+                  <a:lnTo>
+                    <a:pt x="1290094" y="0"/>
+                  </a:lnTo>
+                  <a:lnTo>
+                    <a:pt x="1290094" y="6858000"/>
+                  </a:lnTo>
+                  <a:lnTo>
+                    <a:pt x="0" y="6858000"/>
+                  </a:lnTo>
+                  <a:lnTo>
+                    <a:pt x="1019735" y="0"/>
+                  </a:lnTo>
+                  <a:close/>
+                </a:path>
+              </a:pathLst>
+            </a:custGeom>
+            <a:solidFill>
+              <a:schemeClr val="accent1">
+                <a:lumMod val="60000"/>
+                <a:lumOff val="40000"/>
+                <a:alpha val="70000"/>
+              </a:schemeClr>
+            </a:solidFill>
+            <a:ln>
+              <a:noFill/>
+            </a:ln>
+            <a:effectLst/>
+          </p:spPr>
+          <p:style>
+            <a:lnRef idx="1">
+              <a:schemeClr val="accent1"/>
+            </a:lnRef>
+            <a:fillRef idx="3">
+              <a:schemeClr val="accent1"/>
+            </a:fillRef>
+            <a:effectRef idx="2">
+              <a:schemeClr val="accent1"/>
+            </a:effectRef>
+            <a:fontRef idx="minor">
+              <a:schemeClr val="lt1"/>
+            </a:fontRef>
+          </p:style>
+        </p:sp>
+        <p:sp>
+          <p:nvSpPr>
+            <p:cNvPr id="51" name="Rectangle 29">
+              <a:extLst>
+                <a:ext uri="{FF2B5EF4-FFF2-40B4-BE49-F238E27FC236}">
+                  <a16:creationId xmlns:a16="http://schemas.microsoft.com/office/drawing/2014/main" id="{374B9941-AFBE-4A77-A50E-B6EA04A746AE}"/>
+                </a:ext>
+                <a:ext uri="{C183D7F6-B498-43B3-948B-1728B52AA6E4}">
+                  <adec:decorative xmlns:adec="http://schemas.microsoft.com/office/drawing/2017/decorative" val="1"/>
+                </a:ext>
+              </a:extLst>
+            </p:cNvPr>
+            <p:cNvSpPr/>
+            <p:nvPr>
+              <p:extLst>
+                <p:ext uri="{386F3935-93C4-4BCD-93E2-E3B085C9AB24}">
+                  <p16:designElem xmlns:p16="http://schemas.microsoft.com/office/powerpoint/2015/main" val="1"/>
+                </p:ext>
+              </p:extLst>
+            </p:nvPr>
+          </p:nvSpPr>
+          <p:spPr>
+            <a:xfrm>
+              <a:off x="10938999" y="-8467"/>
+              <a:ext cx="1249825" cy="6866467"/>
+            </a:xfrm>
+            <a:custGeom>
+              <a:avLst/>
+              <a:gdLst/>
+              <a:ahLst/>
+              <a:cxnLst/>
+              <a:rect l="l" t="t" r="r" b="b"/>
+              <a:pathLst>
+                <a:path w="1249825" h="6858000">
+                  <a:moveTo>
+                    <a:pt x="0" y="0"/>
+                  </a:moveTo>
+                  <a:lnTo>
+                    <a:pt x="1249825" y="0"/>
+                  </a:lnTo>
+                  <a:lnTo>
+                    <a:pt x="1249825" y="6858000"/>
+                  </a:lnTo>
+                  <a:lnTo>
+                    <a:pt x="1109382" y="6858000"/>
+                  </a:lnTo>
+                  <a:lnTo>
+                    <a:pt x="0" y="0"/>
+                  </a:lnTo>
+                  <a:close/>
+                </a:path>
+              </a:pathLst>
+            </a:custGeom>
+            <a:solidFill>
+              <a:schemeClr val="accent1">
+                <a:alpha val="65000"/>
+              </a:schemeClr>
+            </a:solidFill>
+            <a:ln>
+              <a:noFill/>
+            </a:ln>
+            <a:effectLst/>
+          </p:spPr>
+          <p:style>
+            <a:lnRef idx="1">
+              <a:schemeClr val="accent1"/>
+            </a:lnRef>
+            <a:fillRef idx="3">
+              <a:schemeClr val="accent1"/>
+            </a:fillRef>
+            <a:effectRef idx="2">
+              <a:schemeClr val="accent1"/>
+            </a:effectRef>
+            <a:fontRef idx="minor">
+              <a:schemeClr val="lt1"/>
+            </a:fontRef>
+          </p:style>
+        </p:sp>
+        <p:sp>
+          <p:nvSpPr>
+            <p:cNvPr id="52" name="Isosceles Triangle 51">
+              <a:extLst>
+                <a:ext uri="{FF2B5EF4-FFF2-40B4-BE49-F238E27FC236}">
+                  <a16:creationId xmlns:a16="http://schemas.microsoft.com/office/drawing/2014/main" id="{27A982C5-2C38-4CE9-BC18-94697AD657FB}"/>
+                </a:ext>
+                <a:ext uri="{C183D7F6-B498-43B3-948B-1728B52AA6E4}">
+                  <adec:decorative xmlns:adec="http://schemas.microsoft.com/office/drawing/2017/decorative" val="1"/>
+                </a:ext>
+              </a:extLst>
+            </p:cNvPr>
+            <p:cNvSpPr/>
+            <p:nvPr>
+              <p:extLst>
+                <p:ext uri="{386F3935-93C4-4BCD-93E2-E3B085C9AB24}">
+                  <p16:designElem xmlns:p16="http://schemas.microsoft.com/office/powerpoint/2015/main" val="1"/>
+                </p:ext>
+              </p:extLst>
+            </p:nvPr>
+          </p:nvSpPr>
+          <p:spPr>
+            <a:xfrm>
+              <a:off x="10371666" y="3589867"/>
+              <a:ext cx="1817159" cy="3268133"/>
+            </a:xfrm>
+            <a:prstGeom prst="triangle">
+              <a:avLst>
+                <a:gd name="adj" fmla="val 100000"/>
+              </a:avLst>
+            </a:prstGeom>
+            <a:solidFill>
+              <a:schemeClr val="accent1">
+                <a:alpha val="80000"/>
+              </a:schemeClr>
+            </a:solidFill>
+            <a:ln>
+              <a:noFill/>
+            </a:ln>
+            <a:effectLst/>
+          </p:spPr>
+          <p:style>
+            <a:lnRef idx="1">
+              <a:schemeClr val="accent1"/>
+            </a:lnRef>
+            <a:fillRef idx="3">
+              <a:schemeClr val="accent1"/>
+            </a:fillRef>
+            <a:effectRef idx="2">
+              <a:schemeClr val="accent1"/>
+            </a:effectRef>
+            <a:fontRef idx="minor">
+              <a:schemeClr val="lt1"/>
+            </a:fontRef>
+          </p:style>
+        </p:sp>
+        <p:sp>
+          <p:nvSpPr>
+            <p:cNvPr id="53" name="Isosceles Triangle 52">
+              <a:extLst>
+                <a:ext uri="{FF2B5EF4-FFF2-40B4-BE49-F238E27FC236}">
+                  <a16:creationId xmlns:a16="http://schemas.microsoft.com/office/drawing/2014/main" id="{0060D8D1-7BB1-498F-AFBB-ADAC130A9E90}"/>
+                </a:ext>
+                <a:ext uri="{C183D7F6-B498-43B3-948B-1728B52AA6E4}">
+                  <adec:decorative xmlns:adec="http://schemas.microsoft.com/office/drawing/2017/decorative" val="1"/>
+                </a:ext>
+              </a:extLst>
+            </p:cNvPr>
+            <p:cNvSpPr/>
+            <p:nvPr>
+              <p:extLst>
+                <p:ext uri="{386F3935-93C4-4BCD-93E2-E3B085C9AB24}">
+                  <p16:designElem xmlns:p16="http://schemas.microsoft.com/office/powerpoint/2015/main" val="1"/>
+                </p:ext>
+              </p:extLst>
+            </p:nvPr>
+          </p:nvSpPr>
+          <p:spPr>
+            <a:xfrm rot="10800000">
+              <a:off x="0" y="0"/>
+              <a:ext cx="842596" cy="5666154"/>
+            </a:xfrm>
+            <a:prstGeom prst="triangle">
+              <a:avLst>
+                <a:gd name="adj" fmla="val 100000"/>
+              </a:avLst>
+            </a:prstGeom>
+            <a:solidFill>
+              <a:schemeClr val="accent1">
+                <a:alpha val="85000"/>
+              </a:schemeClr>
+            </a:solidFill>
+            <a:ln>
+              <a:noFill/>
+            </a:ln>
+            <a:effectLst/>
+          </p:spPr>
+          <p:style>
+            <a:lnRef idx="1">
+              <a:schemeClr val="accent1"/>
+            </a:lnRef>
+            <a:fillRef idx="3">
+              <a:schemeClr val="accent1"/>
+            </a:fillRef>
+            <a:effectRef idx="2">
+              <a:schemeClr val="accent1"/>
+            </a:effectRef>
+            <a:fontRef idx="minor">
+              <a:schemeClr val="lt1"/>
+            </a:fontRef>
+          </p:style>
+        </p:sp>
+      </p:grpSp>
       <p:sp>
         <p:nvSpPr>
           <p:cNvPr id="2" name="Title 1">
@@ -8434,20 +9479,20 @@
         </p:nvSpPr>
         <p:spPr>
           <a:xfrm>
-            <a:off x="444652" y="2379904"/>
-            <a:ext cx="4203045" cy="1375608"/>
+            <a:off x="1580996" y="4725878"/>
+            <a:ext cx="7673801" cy="1087656"/>
           </a:xfrm>
         </p:spPr>
         <p:txBody>
-          <a:bodyPr vert="horz" lIns="91440" tIns="45720" rIns="91440" bIns="45720" rtlCol="0" anchor="ctr">
+          <a:bodyPr vert="horz" lIns="91440" tIns="45720" rIns="91440" bIns="45720" rtlCol="0" anchor="b">
             <a:normAutofit/>
           </a:bodyPr>
           <a:lstStyle/>
           <a:p>
             <a:r>
-              <a:rPr lang="en-US" kern="1200" dirty="0">
+              <a:rPr lang="en-US" sz="4800" kern="1200" dirty="0">
                 <a:solidFill>
-                  <a:schemeClr val="bg1"/>
+                  <a:schemeClr val="accent1"/>
                 </a:solidFill>
                 <a:latin typeface="+mj-lt"/>
                 <a:ea typeface="+mj-ea"/>
@@ -8458,71 +9503,42 @@
           </a:p>
         </p:txBody>
       </p:sp>
-      <p:sp>
-        <p:nvSpPr>
-          <p:cNvPr id="38" name="Isosceles Triangle 37">
+      <p:pic>
+        <p:nvPicPr>
+          <p:cNvPr id="4" name="Picture 3" descr="Diagram&#10;&#10;Description automatically generated with medium confidence">
             <a:extLst>
               <a:ext uri="{FF2B5EF4-FFF2-40B4-BE49-F238E27FC236}">
-                <a16:creationId xmlns:a16="http://schemas.microsoft.com/office/drawing/2014/main" id="{B2205F6E-03C6-4E92-877C-E2482F6599AA}"/>
-              </a:ext>
-              <a:ext uri="{C183D7F6-B498-43B3-948B-1728B52AA6E4}">
-                <adec:decorative xmlns:adec="http://schemas.microsoft.com/office/drawing/2017/decorative" val="1"/>
+                <a16:creationId xmlns:a16="http://schemas.microsoft.com/office/drawing/2014/main" id="{E03386BA-5E23-474E-9B3B-8E97318DC1CB}"/>
               </a:ext>
             </a:extLst>
           </p:cNvPr>
-          <p:cNvSpPr>
-            <a:spLocks noGrp="1" noRot="1" noChangeAspect="1" noMove="1" noResize="1" noEditPoints="1" noAdjustHandles="1" noChangeArrowheads="1" noChangeShapeType="1" noTextEdit="1"/>
-          </p:cNvSpPr>
-          <p:nvPr>
-            <p:extLst>
-              <p:ext uri="{386F3935-93C4-4BCD-93E2-E3B085C9AB24}">
-                <p16:designElem xmlns:p16="http://schemas.microsoft.com/office/powerpoint/2015/main" val="1"/>
-              </p:ext>
-            </p:extLst>
-          </p:nvPr>
-        </p:nvSpPr>
+          <p:cNvPicPr>
+            <a:picLocks noChangeAspect="1"/>
+          </p:cNvPicPr>
+          <p:nvPr/>
+        </p:nvPicPr>
+        <p:blipFill>
+          <a:blip r:embed="rId2">
+            <a:extLst>
+              <a:ext uri="{28A0092B-C50C-407E-A947-70E740481C1C}">
+                <a14:useLocalDpi xmlns:a14="http://schemas.microsoft.com/office/drawing/2010/main" val="0"/>
+              </a:ext>
+            </a:extLst>
+          </a:blip>
+          <a:stretch>
+            <a:fillRect/>
+          </a:stretch>
+        </p:blipFill>
         <p:spPr>
-          <a:xfrm flipH="1">
-            <a:off x="11755696" y="4013200"/>
-            <a:ext cx="448733" cy="2844800"/>
+          <a:xfrm>
+            <a:off x="754852" y="742244"/>
+            <a:ext cx="8818340" cy="4210756"/>
           </a:xfrm>
-          <a:prstGeom prst="triangle">
-            <a:avLst>
-              <a:gd name="adj" fmla="val 0"/>
-            </a:avLst>
+          <a:prstGeom prst="rect">
+            <a:avLst/>
           </a:prstGeom>
-          <a:solidFill>
-            <a:schemeClr val="accent1">
-              <a:alpha val="85000"/>
-            </a:schemeClr>
-          </a:solidFill>
-          <a:ln>
-            <a:noFill/>
-          </a:ln>
-          <a:effectLst/>
         </p:spPr>
-        <p:style>
-          <a:lnRef idx="1">
-            <a:schemeClr val="accent1"/>
-          </a:lnRef>
-          <a:fillRef idx="3">
-            <a:schemeClr val="accent1"/>
-          </a:fillRef>
-          <a:effectRef idx="2">
-            <a:schemeClr val="accent1"/>
-          </a:effectRef>
-          <a:fontRef idx="minor">
-            <a:schemeClr val="lt1"/>
-          </a:fontRef>
-        </p:style>
-        <p:txBody>
-          <a:bodyPr/>
-          <a:lstStyle/>
-          <a:p>
-            <a:endParaRPr lang="en-US" dirty="0"/>
-          </a:p>
-        </p:txBody>
-      </p:sp>
+      </p:pic>
     </p:spTree>
     <p:extLst>
       <p:ext uri="{BB962C8B-B14F-4D97-AF65-F5344CB8AC3E}">
@@ -8852,6 +9868,43 @@
           </a:p>
         </p:txBody>
       </p:sp>
+      <p:pic>
+        <p:nvPicPr>
+          <p:cNvPr id="4" name="Picture 3" descr="Graphical user interface, chart, application&#10;&#10;Description automatically generated">
+            <a:hlinkClick r:id="rId2"/>
+            <a:extLst>
+              <a:ext uri="{FF2B5EF4-FFF2-40B4-BE49-F238E27FC236}">
+                <a16:creationId xmlns:a16="http://schemas.microsoft.com/office/drawing/2014/main" id="{E04D52E7-9EB2-4D3E-BFEC-E0DD4F7D1331}"/>
+              </a:ext>
+            </a:extLst>
+          </p:cNvPr>
+          <p:cNvPicPr>
+            <a:picLocks noChangeAspect="1"/>
+          </p:cNvPicPr>
+          <p:nvPr/>
+        </p:nvPicPr>
+        <p:blipFill>
+          <a:blip r:embed="rId3">
+            <a:extLst>
+              <a:ext uri="{28A0092B-C50C-407E-A947-70E740481C1C}">
+                <a14:useLocalDpi xmlns:a14="http://schemas.microsoft.com/office/drawing/2010/main" val="0"/>
+              </a:ext>
+            </a:extLst>
+          </a:blip>
+          <a:stretch>
+            <a:fillRect/>
+          </a:stretch>
+        </p:blipFill>
+        <p:spPr>
+          <a:xfrm>
+            <a:off x="5863526" y="1145819"/>
+            <a:ext cx="5745516" cy="4566356"/>
+          </a:xfrm>
+          <a:prstGeom prst="rect">
+            <a:avLst/>
+          </a:prstGeom>
+        </p:spPr>
+      </p:pic>
     </p:spTree>
     <p:extLst>
       <p:ext uri="{BB962C8B-B14F-4D97-AF65-F5344CB8AC3E}">
@@ -8986,16 +10039,8 @@
               <a:buNone/>
             </a:pPr>
             <a:r>
-              <a:rPr lang="en-US" sz="1100" dirty="0"/>
-              <a:t>Bias- difference </a:t>
-            </a:r>
-            <a:r>
-              <a:rPr lang="en-US" sz="1100" dirty="0" err="1"/>
-              <a:t>btwn</a:t>
-            </a:r>
-            <a:r>
-              <a:rPr lang="en-US" sz="1100" dirty="0"/>
-              <a:t> observed and predicted; less power and underfit</a:t>
+              <a:rPr lang="en-US" sz="1100" u="sng" dirty="0"/>
+              <a:t>Model Stats</a:t>
             </a:r>
           </a:p>
           <a:p>
@@ -9005,84 +10050,7 @@
               </a:lnSpc>
               <a:buNone/>
             </a:pPr>
-            <a:r>
-              <a:rPr lang="en-US" sz="1100" dirty="0"/>
-              <a:t>Variance- difference in performance </a:t>
-            </a:r>
-            <a:r>
-              <a:rPr lang="en-US" sz="1100" dirty="0" err="1"/>
-              <a:t>btwn</a:t>
-            </a:r>
-            <a:r>
-              <a:rPr lang="en-US" sz="1100" dirty="0"/>
-              <a:t> test and train; high variance = model fits training data well but does not generalize well on test sets</a:t>
-            </a:r>
-          </a:p>
-          <a:p>
-            <a:pPr marL="0" indent="0">
-              <a:lnSpc>
-                <a:spcPct val="90000"/>
-              </a:lnSpc>
-              <a:buNone/>
-            </a:pPr>
             <a:endParaRPr lang="en-US" sz="1100" dirty="0"/>
-          </a:p>
-          <a:p>
-            <a:pPr marL="0" indent="0">
-              <a:lnSpc>
-                <a:spcPct val="90000"/>
-              </a:lnSpc>
-              <a:buNone/>
-            </a:pPr>
-            <a:r>
-              <a:rPr lang="en-US" sz="1100" u="sng" dirty="0"/>
-              <a:t>Model Stats</a:t>
-            </a:r>
-          </a:p>
-          <a:p>
-            <a:pPr marL="0" indent="0">
-              <a:lnSpc>
-                <a:spcPct val="90000"/>
-              </a:lnSpc>
-              <a:buNone/>
-            </a:pPr>
-            <a:r>
-              <a:rPr lang="en-US" sz="1100" dirty="0"/>
-              <a:t>Bias: </a:t>
-            </a:r>
-          </a:p>
-          <a:p>
-            <a:pPr marL="0" indent="0">
-              <a:lnSpc>
-                <a:spcPct val="90000"/>
-              </a:lnSpc>
-              <a:buNone/>
-            </a:pPr>
-            <a:r>
-              <a:rPr lang="en-US" sz="1100" dirty="0"/>
-              <a:t>Variance:</a:t>
-            </a:r>
-          </a:p>
-          <a:p>
-            <a:pPr marL="0" indent="0">
-              <a:lnSpc>
-                <a:spcPct val="90000"/>
-              </a:lnSpc>
-              <a:buNone/>
-            </a:pPr>
-            <a:endParaRPr lang="en-US" sz="1100" dirty="0"/>
-          </a:p>
-          <a:p>
-            <a:pPr marL="0" indent="0">
-              <a:lnSpc>
-                <a:spcPct val="90000"/>
-              </a:lnSpc>
-              <a:buNone/>
-            </a:pPr>
-            <a:r>
-              <a:rPr lang="en-US" sz="1100" dirty="0"/>
-              <a:t>What does this mean?</a:t>
-            </a:r>
           </a:p>
           <a:p>
             <a:pPr marL="0" indent="0">
@@ -9207,6 +10175,42 @@
           </a:fontRef>
         </p:style>
       </p:sp>
+      <p:pic>
+        <p:nvPicPr>
+          <p:cNvPr id="6" name="Picture 5" descr="Calendar&#10;&#10;Description automatically generated">
+            <a:extLst>
+              <a:ext uri="{FF2B5EF4-FFF2-40B4-BE49-F238E27FC236}">
+                <a16:creationId xmlns:a16="http://schemas.microsoft.com/office/drawing/2014/main" id="{FB47985B-9FF3-489C-9EED-ED7D87056DDD}"/>
+              </a:ext>
+            </a:extLst>
+          </p:cNvPr>
+          <p:cNvPicPr>
+            <a:picLocks noChangeAspect="1"/>
+          </p:cNvPicPr>
+          <p:nvPr/>
+        </p:nvPicPr>
+        <p:blipFill>
+          <a:blip r:embed="rId4">
+            <a:extLst>
+              <a:ext uri="{28A0092B-C50C-407E-A947-70E740481C1C}">
+                <a14:useLocalDpi xmlns:a14="http://schemas.microsoft.com/office/drawing/2010/main" val="0"/>
+              </a:ext>
+            </a:extLst>
+          </a:blip>
+          <a:stretch>
+            <a:fillRect/>
+          </a:stretch>
+        </p:blipFill>
+        <p:spPr>
+          <a:xfrm>
+            <a:off x="5295018" y="3223693"/>
+            <a:ext cx="2886478" cy="2057687"/>
+          </a:xfrm>
+          <a:prstGeom prst="rect">
+            <a:avLst/>
+          </a:prstGeom>
+        </p:spPr>
+      </p:pic>
     </p:spTree>
     <p:extLst>
       <p:ext uri="{BB962C8B-B14F-4D97-AF65-F5344CB8AC3E}">

</xml_diff>